<commit_message>
Added a beautiful(?) graph that visualizes prefetching
</commit_message>
<xml_diff>
--- a/final_presentation.pptx
+++ b/final_presentation.pptx
@@ -5,10 +5,10 @@
     <p:sldMasterId id="2147483661" r:id="rId1"/>
   </p:sldMasterIdLst>
   <p:notesMasterIdLst>
-    <p:notesMasterId r:id="rId16"/>
+    <p:notesMasterId r:id="rId22"/>
   </p:notesMasterIdLst>
   <p:handoutMasterIdLst>
-    <p:handoutMasterId r:id="rId17"/>
+    <p:handoutMasterId r:id="rId23"/>
   </p:handoutMasterIdLst>
   <p:sldIdLst>
     <p:sldId id="256" r:id="rId2"/>
@@ -23,8 +23,14 @@
     <p:sldId id="434" r:id="rId11"/>
     <p:sldId id="435" r:id="rId12"/>
     <p:sldId id="436" r:id="rId13"/>
-    <p:sldId id="420" r:id="rId14"/>
-    <p:sldId id="425" r:id="rId15"/>
+    <p:sldId id="437" r:id="rId14"/>
+    <p:sldId id="442" r:id="rId15"/>
+    <p:sldId id="438" r:id="rId16"/>
+    <p:sldId id="439" r:id="rId17"/>
+    <p:sldId id="440" r:id="rId18"/>
+    <p:sldId id="441" r:id="rId19"/>
+    <p:sldId id="420" r:id="rId20"/>
+    <p:sldId id="425" r:id="rId21"/>
   </p:sldIdLst>
   <p:sldSz cx="9144000" cy="6858000" type="screen4x3"/>
   <p:notesSz cx="9926638" cy="6797675"/>
@@ -1065,7 +1071,7 @@
           <a:bodyPr/>
           <a:lstStyle/>
           <a:p>
-            <a:endParaRPr lang="en-US" dirty="0"/>
+            <a:endParaRPr lang="en-US"/>
           </a:p>
         </p:txBody>
       </p:sp>
@@ -1087,6 +1093,540 @@
             <a:fld id="{B4A3401A-85D7-4E8B-A870-E455B7B50306}" type="slidenum">
               <a:rPr lang="en-US" smtClean="0"/>
               <a:t>13</a:t>
+            </a:fld>
+            <a:endParaRPr lang="en-US"/>
+          </a:p>
+        </p:txBody>
+      </p:sp>
+    </p:spTree>
+    <p:extLst>
+      <p:ext uri="{BB962C8B-B14F-4D97-AF65-F5344CB8AC3E}">
+        <p14:creationId xmlns:p14="http://schemas.microsoft.com/office/powerpoint/2010/main" val="346269536"/>
+      </p:ext>
+    </p:extLst>
+  </p:cSld>
+  <p:clrMapOvr>
+    <a:masterClrMapping/>
+  </p:clrMapOvr>
+</p:notes>
+</file>
+
+<file path=ppt/notesSlides/notesSlide14.xml><?xml version="1.0" encoding="utf-8"?>
+<p:notes xmlns:a="http://schemas.openxmlformats.org/drawingml/2006/main" xmlns:r="http://schemas.openxmlformats.org/officeDocument/2006/relationships" xmlns:p="http://schemas.openxmlformats.org/presentationml/2006/main">
+  <p:cSld>
+    <p:spTree>
+      <p:nvGrpSpPr>
+        <p:cNvPr id="1" name=""/>
+        <p:cNvGrpSpPr/>
+        <p:nvPr/>
+      </p:nvGrpSpPr>
+      <p:grpSpPr>
+        <a:xfrm>
+          <a:off x="0" y="0"/>
+          <a:ext cx="0" cy="0"/>
+          <a:chOff x="0" y="0"/>
+          <a:chExt cx="0" cy="0"/>
+        </a:xfrm>
+      </p:grpSpPr>
+      <p:sp>
+        <p:nvSpPr>
+          <p:cNvPr id="2" name="Slide Image Placeholder 1"/>
+          <p:cNvSpPr>
+            <a:spLocks noGrp="1" noRot="1" noChangeAspect="1"/>
+          </p:cNvSpPr>
+          <p:nvPr>
+            <p:ph type="sldImg"/>
+          </p:nvPr>
+        </p:nvSpPr>
+        <p:spPr>
+          <a:xfrm>
+            <a:off x="3433763" y="849313"/>
+            <a:ext cx="3059112" cy="2293937"/>
+          </a:xfrm>
+        </p:spPr>
+      </p:sp>
+      <p:sp>
+        <p:nvSpPr>
+          <p:cNvPr id="3" name="Notes Placeholder 2"/>
+          <p:cNvSpPr>
+            <a:spLocks noGrp="1"/>
+          </p:cNvSpPr>
+          <p:nvPr>
+            <p:ph type="body" idx="1"/>
+          </p:nvPr>
+        </p:nvSpPr>
+        <p:spPr/>
+        <p:txBody>
+          <a:bodyPr/>
+          <a:lstStyle/>
+          <a:p>
+            <a:endParaRPr lang="en-US"/>
+          </a:p>
+        </p:txBody>
+      </p:sp>
+      <p:sp>
+        <p:nvSpPr>
+          <p:cNvPr id="4" name="Slide Number Placeholder 3"/>
+          <p:cNvSpPr>
+            <a:spLocks noGrp="1"/>
+          </p:cNvSpPr>
+          <p:nvPr>
+            <p:ph type="sldNum" sz="quarter" idx="10"/>
+          </p:nvPr>
+        </p:nvSpPr>
+        <p:spPr/>
+        <p:txBody>
+          <a:bodyPr/>
+          <a:lstStyle/>
+          <a:p>
+            <a:fld id="{B4A3401A-85D7-4E8B-A870-E455B7B50306}" type="slidenum">
+              <a:rPr lang="en-US" smtClean="0"/>
+              <a:t>14</a:t>
+            </a:fld>
+            <a:endParaRPr lang="en-US"/>
+          </a:p>
+        </p:txBody>
+      </p:sp>
+    </p:spTree>
+    <p:extLst>
+      <p:ext uri="{BB962C8B-B14F-4D97-AF65-F5344CB8AC3E}">
+        <p14:creationId xmlns:p14="http://schemas.microsoft.com/office/powerpoint/2010/main" val="162118960"/>
+      </p:ext>
+    </p:extLst>
+  </p:cSld>
+  <p:clrMapOvr>
+    <a:masterClrMapping/>
+  </p:clrMapOvr>
+</p:notes>
+</file>
+
+<file path=ppt/notesSlides/notesSlide15.xml><?xml version="1.0" encoding="utf-8"?>
+<p:notes xmlns:a="http://schemas.openxmlformats.org/drawingml/2006/main" xmlns:r="http://schemas.openxmlformats.org/officeDocument/2006/relationships" xmlns:p="http://schemas.openxmlformats.org/presentationml/2006/main">
+  <p:cSld>
+    <p:spTree>
+      <p:nvGrpSpPr>
+        <p:cNvPr id="1" name=""/>
+        <p:cNvGrpSpPr/>
+        <p:nvPr/>
+      </p:nvGrpSpPr>
+      <p:grpSpPr>
+        <a:xfrm>
+          <a:off x="0" y="0"/>
+          <a:ext cx="0" cy="0"/>
+          <a:chOff x="0" y="0"/>
+          <a:chExt cx="0" cy="0"/>
+        </a:xfrm>
+      </p:grpSpPr>
+      <p:sp>
+        <p:nvSpPr>
+          <p:cNvPr id="2" name="Slide Image Placeholder 1"/>
+          <p:cNvSpPr>
+            <a:spLocks noGrp="1" noRot="1" noChangeAspect="1"/>
+          </p:cNvSpPr>
+          <p:nvPr>
+            <p:ph type="sldImg"/>
+          </p:nvPr>
+        </p:nvSpPr>
+        <p:spPr>
+          <a:xfrm>
+            <a:off x="3433763" y="849313"/>
+            <a:ext cx="3059112" cy="2293937"/>
+          </a:xfrm>
+        </p:spPr>
+      </p:sp>
+      <p:sp>
+        <p:nvSpPr>
+          <p:cNvPr id="3" name="Notes Placeholder 2"/>
+          <p:cNvSpPr>
+            <a:spLocks noGrp="1"/>
+          </p:cNvSpPr>
+          <p:nvPr>
+            <p:ph type="body" idx="1"/>
+          </p:nvPr>
+        </p:nvSpPr>
+        <p:spPr/>
+        <p:txBody>
+          <a:bodyPr/>
+          <a:lstStyle/>
+          <a:p>
+            <a:endParaRPr lang="en-US"/>
+          </a:p>
+        </p:txBody>
+      </p:sp>
+      <p:sp>
+        <p:nvSpPr>
+          <p:cNvPr id="4" name="Slide Number Placeholder 3"/>
+          <p:cNvSpPr>
+            <a:spLocks noGrp="1"/>
+          </p:cNvSpPr>
+          <p:nvPr>
+            <p:ph type="sldNum" sz="quarter" idx="10"/>
+          </p:nvPr>
+        </p:nvSpPr>
+        <p:spPr/>
+        <p:txBody>
+          <a:bodyPr/>
+          <a:lstStyle/>
+          <a:p>
+            <a:fld id="{B4A3401A-85D7-4E8B-A870-E455B7B50306}" type="slidenum">
+              <a:rPr lang="en-US" smtClean="0"/>
+              <a:t>15</a:t>
+            </a:fld>
+            <a:endParaRPr lang="en-US"/>
+          </a:p>
+        </p:txBody>
+      </p:sp>
+    </p:spTree>
+    <p:extLst>
+      <p:ext uri="{BB962C8B-B14F-4D97-AF65-F5344CB8AC3E}">
+        <p14:creationId xmlns:p14="http://schemas.microsoft.com/office/powerpoint/2010/main" val="77349179"/>
+      </p:ext>
+    </p:extLst>
+  </p:cSld>
+  <p:clrMapOvr>
+    <a:masterClrMapping/>
+  </p:clrMapOvr>
+</p:notes>
+</file>
+
+<file path=ppt/notesSlides/notesSlide16.xml><?xml version="1.0" encoding="utf-8"?>
+<p:notes xmlns:a="http://schemas.openxmlformats.org/drawingml/2006/main" xmlns:r="http://schemas.openxmlformats.org/officeDocument/2006/relationships" xmlns:p="http://schemas.openxmlformats.org/presentationml/2006/main">
+  <p:cSld>
+    <p:spTree>
+      <p:nvGrpSpPr>
+        <p:cNvPr id="1" name=""/>
+        <p:cNvGrpSpPr/>
+        <p:nvPr/>
+      </p:nvGrpSpPr>
+      <p:grpSpPr>
+        <a:xfrm>
+          <a:off x="0" y="0"/>
+          <a:ext cx="0" cy="0"/>
+          <a:chOff x="0" y="0"/>
+          <a:chExt cx="0" cy="0"/>
+        </a:xfrm>
+      </p:grpSpPr>
+      <p:sp>
+        <p:nvSpPr>
+          <p:cNvPr id="2" name="Slide Image Placeholder 1"/>
+          <p:cNvSpPr>
+            <a:spLocks noGrp="1" noRot="1" noChangeAspect="1"/>
+          </p:cNvSpPr>
+          <p:nvPr>
+            <p:ph type="sldImg"/>
+          </p:nvPr>
+        </p:nvSpPr>
+        <p:spPr>
+          <a:xfrm>
+            <a:off x="3433763" y="849313"/>
+            <a:ext cx="3059112" cy="2293937"/>
+          </a:xfrm>
+        </p:spPr>
+      </p:sp>
+      <p:sp>
+        <p:nvSpPr>
+          <p:cNvPr id="3" name="Notes Placeholder 2"/>
+          <p:cNvSpPr>
+            <a:spLocks noGrp="1"/>
+          </p:cNvSpPr>
+          <p:nvPr>
+            <p:ph type="body" idx="1"/>
+          </p:nvPr>
+        </p:nvSpPr>
+        <p:spPr/>
+        <p:txBody>
+          <a:bodyPr/>
+          <a:lstStyle/>
+          <a:p>
+            <a:endParaRPr lang="en-US"/>
+          </a:p>
+        </p:txBody>
+      </p:sp>
+      <p:sp>
+        <p:nvSpPr>
+          <p:cNvPr id="4" name="Slide Number Placeholder 3"/>
+          <p:cNvSpPr>
+            <a:spLocks noGrp="1"/>
+          </p:cNvSpPr>
+          <p:nvPr>
+            <p:ph type="sldNum" sz="quarter" idx="10"/>
+          </p:nvPr>
+        </p:nvSpPr>
+        <p:spPr/>
+        <p:txBody>
+          <a:bodyPr/>
+          <a:lstStyle/>
+          <a:p>
+            <a:fld id="{B4A3401A-85D7-4E8B-A870-E455B7B50306}" type="slidenum">
+              <a:rPr lang="en-US" smtClean="0"/>
+              <a:t>16</a:t>
+            </a:fld>
+            <a:endParaRPr lang="en-US"/>
+          </a:p>
+        </p:txBody>
+      </p:sp>
+    </p:spTree>
+    <p:extLst>
+      <p:ext uri="{BB962C8B-B14F-4D97-AF65-F5344CB8AC3E}">
+        <p14:creationId xmlns:p14="http://schemas.microsoft.com/office/powerpoint/2010/main" val="346675684"/>
+      </p:ext>
+    </p:extLst>
+  </p:cSld>
+  <p:clrMapOvr>
+    <a:masterClrMapping/>
+  </p:clrMapOvr>
+</p:notes>
+</file>
+
+<file path=ppt/notesSlides/notesSlide17.xml><?xml version="1.0" encoding="utf-8"?>
+<p:notes xmlns:a="http://schemas.openxmlformats.org/drawingml/2006/main" xmlns:r="http://schemas.openxmlformats.org/officeDocument/2006/relationships" xmlns:p="http://schemas.openxmlformats.org/presentationml/2006/main">
+  <p:cSld>
+    <p:spTree>
+      <p:nvGrpSpPr>
+        <p:cNvPr id="1" name=""/>
+        <p:cNvGrpSpPr/>
+        <p:nvPr/>
+      </p:nvGrpSpPr>
+      <p:grpSpPr>
+        <a:xfrm>
+          <a:off x="0" y="0"/>
+          <a:ext cx="0" cy="0"/>
+          <a:chOff x="0" y="0"/>
+          <a:chExt cx="0" cy="0"/>
+        </a:xfrm>
+      </p:grpSpPr>
+      <p:sp>
+        <p:nvSpPr>
+          <p:cNvPr id="2" name="Slide Image Placeholder 1"/>
+          <p:cNvSpPr>
+            <a:spLocks noGrp="1" noRot="1" noChangeAspect="1"/>
+          </p:cNvSpPr>
+          <p:nvPr>
+            <p:ph type="sldImg"/>
+          </p:nvPr>
+        </p:nvSpPr>
+        <p:spPr>
+          <a:xfrm>
+            <a:off x="3433763" y="849313"/>
+            <a:ext cx="3059112" cy="2293937"/>
+          </a:xfrm>
+        </p:spPr>
+      </p:sp>
+      <p:sp>
+        <p:nvSpPr>
+          <p:cNvPr id="3" name="Notes Placeholder 2"/>
+          <p:cNvSpPr>
+            <a:spLocks noGrp="1"/>
+          </p:cNvSpPr>
+          <p:nvPr>
+            <p:ph type="body" idx="1"/>
+          </p:nvPr>
+        </p:nvSpPr>
+        <p:spPr/>
+        <p:txBody>
+          <a:bodyPr/>
+          <a:lstStyle/>
+          <a:p>
+            <a:endParaRPr lang="en-US"/>
+          </a:p>
+        </p:txBody>
+      </p:sp>
+      <p:sp>
+        <p:nvSpPr>
+          <p:cNvPr id="4" name="Slide Number Placeholder 3"/>
+          <p:cNvSpPr>
+            <a:spLocks noGrp="1"/>
+          </p:cNvSpPr>
+          <p:nvPr>
+            <p:ph type="sldNum" sz="quarter" idx="10"/>
+          </p:nvPr>
+        </p:nvSpPr>
+        <p:spPr/>
+        <p:txBody>
+          <a:bodyPr/>
+          <a:lstStyle/>
+          <a:p>
+            <a:fld id="{B4A3401A-85D7-4E8B-A870-E455B7B50306}" type="slidenum">
+              <a:rPr lang="en-US" smtClean="0"/>
+              <a:t>17</a:t>
+            </a:fld>
+            <a:endParaRPr lang="en-US"/>
+          </a:p>
+        </p:txBody>
+      </p:sp>
+    </p:spTree>
+    <p:extLst>
+      <p:ext uri="{BB962C8B-B14F-4D97-AF65-F5344CB8AC3E}">
+        <p14:creationId xmlns:p14="http://schemas.microsoft.com/office/powerpoint/2010/main" val="1292744982"/>
+      </p:ext>
+    </p:extLst>
+  </p:cSld>
+  <p:clrMapOvr>
+    <a:masterClrMapping/>
+  </p:clrMapOvr>
+</p:notes>
+</file>
+
+<file path=ppt/notesSlides/notesSlide18.xml><?xml version="1.0" encoding="utf-8"?>
+<p:notes xmlns:a="http://schemas.openxmlformats.org/drawingml/2006/main" xmlns:r="http://schemas.openxmlformats.org/officeDocument/2006/relationships" xmlns:p="http://schemas.openxmlformats.org/presentationml/2006/main">
+  <p:cSld>
+    <p:spTree>
+      <p:nvGrpSpPr>
+        <p:cNvPr id="1" name=""/>
+        <p:cNvGrpSpPr/>
+        <p:nvPr/>
+      </p:nvGrpSpPr>
+      <p:grpSpPr>
+        <a:xfrm>
+          <a:off x="0" y="0"/>
+          <a:ext cx="0" cy="0"/>
+          <a:chOff x="0" y="0"/>
+          <a:chExt cx="0" cy="0"/>
+        </a:xfrm>
+      </p:grpSpPr>
+      <p:sp>
+        <p:nvSpPr>
+          <p:cNvPr id="2" name="Slide Image Placeholder 1"/>
+          <p:cNvSpPr>
+            <a:spLocks noGrp="1" noRot="1" noChangeAspect="1"/>
+          </p:cNvSpPr>
+          <p:nvPr>
+            <p:ph type="sldImg"/>
+          </p:nvPr>
+        </p:nvSpPr>
+        <p:spPr>
+          <a:xfrm>
+            <a:off x="3433763" y="849313"/>
+            <a:ext cx="3059112" cy="2293937"/>
+          </a:xfrm>
+        </p:spPr>
+      </p:sp>
+      <p:sp>
+        <p:nvSpPr>
+          <p:cNvPr id="3" name="Notes Placeholder 2"/>
+          <p:cNvSpPr>
+            <a:spLocks noGrp="1"/>
+          </p:cNvSpPr>
+          <p:nvPr>
+            <p:ph type="body" idx="1"/>
+          </p:nvPr>
+        </p:nvSpPr>
+        <p:spPr/>
+        <p:txBody>
+          <a:bodyPr/>
+          <a:lstStyle/>
+          <a:p>
+            <a:endParaRPr lang="en-US"/>
+          </a:p>
+        </p:txBody>
+      </p:sp>
+      <p:sp>
+        <p:nvSpPr>
+          <p:cNvPr id="4" name="Slide Number Placeholder 3"/>
+          <p:cNvSpPr>
+            <a:spLocks noGrp="1"/>
+          </p:cNvSpPr>
+          <p:nvPr>
+            <p:ph type="sldNum" sz="quarter" idx="10"/>
+          </p:nvPr>
+        </p:nvSpPr>
+        <p:spPr/>
+        <p:txBody>
+          <a:bodyPr/>
+          <a:lstStyle/>
+          <a:p>
+            <a:fld id="{B4A3401A-85D7-4E8B-A870-E455B7B50306}" type="slidenum">
+              <a:rPr lang="en-US" smtClean="0"/>
+              <a:t>18</a:t>
+            </a:fld>
+            <a:endParaRPr lang="en-US"/>
+          </a:p>
+        </p:txBody>
+      </p:sp>
+    </p:spTree>
+    <p:extLst>
+      <p:ext uri="{BB962C8B-B14F-4D97-AF65-F5344CB8AC3E}">
+        <p14:creationId xmlns:p14="http://schemas.microsoft.com/office/powerpoint/2010/main" val="1154652724"/>
+      </p:ext>
+    </p:extLst>
+  </p:cSld>
+  <p:clrMapOvr>
+    <a:masterClrMapping/>
+  </p:clrMapOvr>
+</p:notes>
+</file>
+
+<file path=ppt/notesSlides/notesSlide19.xml><?xml version="1.0" encoding="utf-8"?>
+<p:notes xmlns:a="http://schemas.openxmlformats.org/drawingml/2006/main" xmlns:r="http://schemas.openxmlformats.org/officeDocument/2006/relationships" xmlns:p="http://schemas.openxmlformats.org/presentationml/2006/main">
+  <p:cSld>
+    <p:spTree>
+      <p:nvGrpSpPr>
+        <p:cNvPr id="1" name=""/>
+        <p:cNvGrpSpPr/>
+        <p:nvPr/>
+      </p:nvGrpSpPr>
+      <p:grpSpPr>
+        <a:xfrm>
+          <a:off x="0" y="0"/>
+          <a:ext cx="0" cy="0"/>
+          <a:chOff x="0" y="0"/>
+          <a:chExt cx="0" cy="0"/>
+        </a:xfrm>
+      </p:grpSpPr>
+      <p:sp>
+        <p:nvSpPr>
+          <p:cNvPr id="2" name="Slide Image Placeholder 1"/>
+          <p:cNvSpPr>
+            <a:spLocks noGrp="1" noRot="1" noChangeAspect="1"/>
+          </p:cNvSpPr>
+          <p:nvPr>
+            <p:ph type="sldImg"/>
+          </p:nvPr>
+        </p:nvSpPr>
+        <p:spPr>
+          <a:xfrm>
+            <a:off x="3433763" y="849313"/>
+            <a:ext cx="3059112" cy="2293937"/>
+          </a:xfrm>
+        </p:spPr>
+      </p:sp>
+      <p:sp>
+        <p:nvSpPr>
+          <p:cNvPr id="3" name="Notes Placeholder 2"/>
+          <p:cNvSpPr>
+            <a:spLocks noGrp="1"/>
+          </p:cNvSpPr>
+          <p:nvPr>
+            <p:ph type="body" idx="1"/>
+          </p:nvPr>
+        </p:nvSpPr>
+        <p:spPr/>
+        <p:txBody>
+          <a:bodyPr/>
+          <a:lstStyle/>
+          <a:p>
+            <a:endParaRPr lang="en-US" dirty="0"/>
+          </a:p>
+        </p:txBody>
+      </p:sp>
+      <p:sp>
+        <p:nvSpPr>
+          <p:cNvPr id="4" name="Slide Number Placeholder 3"/>
+          <p:cNvSpPr>
+            <a:spLocks noGrp="1"/>
+          </p:cNvSpPr>
+          <p:nvPr>
+            <p:ph type="sldNum" sz="quarter" idx="10"/>
+          </p:nvPr>
+        </p:nvSpPr>
+        <p:spPr/>
+        <p:txBody>
+          <a:bodyPr/>
+          <a:lstStyle/>
+          <a:p>
+            <a:fld id="{B4A3401A-85D7-4E8B-A870-E455B7B50306}" type="slidenum">
+              <a:rPr lang="en-US" smtClean="0"/>
+              <a:t>19</a:t>
             </a:fld>
             <a:endParaRPr lang="en-US" dirty="0"/>
           </a:p>
@@ -6672,7 +7212,7 @@
         <p:spPr>
           <a:xfrm>
             <a:off x="349416" y="1026916"/>
-            <a:ext cx="8360830" cy="3847207"/>
+            <a:ext cx="8360830" cy="3970318"/>
           </a:xfrm>
           <a:prstGeom prst="rect">
             <a:avLst/>
@@ -6776,7 +7316,7 @@
           <a:p>
             <a:pPr algn="just"/>
             <a:r>
-              <a:rPr lang="en-US" altLang="ko-KR" sz="2400" b="1" dirty="0" smtClean="0">
+              <a:rPr lang="en-US" altLang="ko-KR" sz="2800" b="1" dirty="0" smtClean="0">
                 <a:solidFill>
                   <a:srgbClr val="7A0019"/>
                 </a:solidFill>
@@ -6784,7 +7324,7 @@
               <a:t>Could </a:t>
             </a:r>
             <a:r>
-              <a:rPr lang="en-US" altLang="ko-KR" sz="2400" b="1" u="sng" dirty="0" smtClean="0">
+              <a:rPr lang="en-US" altLang="ko-KR" sz="2800" b="1" u="sng" dirty="0" smtClean="0">
                 <a:solidFill>
                   <a:srgbClr val="7A0019"/>
                 </a:solidFill>
@@ -6792,7 +7332,7 @@
               <a:t>randomized link prefetching</a:t>
             </a:r>
             <a:r>
-              <a:rPr lang="en-US" altLang="ko-KR" sz="2400" b="1" dirty="0" smtClean="0">
+              <a:rPr lang="en-US" altLang="ko-KR" sz="2800" b="1" dirty="0" smtClean="0">
                 <a:solidFill>
                   <a:srgbClr val="7A0019"/>
                 </a:solidFill>
@@ -6800,7 +7340,7 @@
               <a:t> provide </a:t>
             </a:r>
             <a:r>
-              <a:rPr lang="en-US" altLang="ko-KR" sz="2400" b="1" u="sng" dirty="0" smtClean="0">
+              <a:rPr lang="en-US" altLang="ko-KR" sz="2800" b="1" u="sng" dirty="0" smtClean="0">
                 <a:solidFill>
                   <a:srgbClr val="7A0019"/>
                 </a:solidFill>
@@ -6808,7 +7348,7 @@
               <a:t>extra defense</a:t>
             </a:r>
             <a:r>
-              <a:rPr lang="en-US" altLang="ko-KR" sz="2400" b="1" dirty="0" smtClean="0">
+              <a:rPr lang="en-US" altLang="ko-KR" sz="2800" b="1" dirty="0" smtClean="0">
                 <a:solidFill>
                   <a:srgbClr val="7A0019"/>
                 </a:solidFill>
@@ -6816,7 +7356,7 @@
               <a:t> against website </a:t>
             </a:r>
             <a:r>
-              <a:rPr lang="en-US" altLang="ko-KR" sz="2400" b="1" u="sng" dirty="0" smtClean="0">
+              <a:rPr lang="en-US" altLang="ko-KR" sz="2800" b="1" u="sng" dirty="0" smtClean="0">
                 <a:solidFill>
                   <a:srgbClr val="7A0019"/>
                 </a:solidFill>
@@ -6824,7 +7364,7 @@
               <a:t>fingerprinting attacks</a:t>
             </a:r>
             <a:r>
-              <a:rPr lang="en-US" altLang="ko-KR" sz="2400" b="1" dirty="0" smtClean="0">
+              <a:rPr lang="en-US" altLang="ko-KR" sz="2800" b="1" dirty="0" smtClean="0">
                 <a:solidFill>
                   <a:srgbClr val="7A0019"/>
                 </a:solidFill>
@@ -7451,46 +7991,6 @@
       </p:grpSpPr>
       <p:sp>
         <p:nvSpPr>
-          <p:cNvPr id="9" name="Rectangle 8"/>
-          <p:cNvSpPr/>
-          <p:nvPr/>
-        </p:nvSpPr>
-        <p:spPr>
-          <a:xfrm>
-            <a:off x="319925" y="966920"/>
-            <a:ext cx="8331015" cy="769441"/>
-          </a:xfrm>
-          <a:prstGeom prst="rect">
-            <a:avLst/>
-          </a:prstGeom>
-        </p:spPr>
-        <p:txBody>
-          <a:bodyPr wrap="square">
-            <a:spAutoFit/>
-          </a:bodyPr>
-          <a:lstStyle/>
-          <a:p>
-            <a:pPr lvl="0" algn="just" latinLnBrk="1"/>
-            <a:r>
-              <a:rPr lang="en-US" sz="2400" b="1" dirty="0" smtClean="0"/>
-              <a:t>For</a:t>
-            </a:r>
-          </a:p>
-          <a:p>
-            <a:pPr marL="342900" lvl="0" indent="-342900" algn="just" latinLnBrk="1">
-              <a:buFont typeface="Arial" panose="020B0604020202020204" pitchFamily="34" charset="0"/>
-              <a:buChar char="•"/>
-            </a:pPr>
-            <a:r>
-              <a:rPr lang="en-US" sz="2000" dirty="0" smtClean="0"/>
-              <a:t>document</a:t>
-            </a:r>
-            <a:endParaRPr lang="en-US" sz="2000" dirty="0"/>
-          </a:p>
-        </p:txBody>
-      </p:sp>
-      <p:sp>
-        <p:nvSpPr>
           <p:cNvPr id="3" name="Slide Number Placeholder 2"/>
           <p:cNvSpPr>
             <a:spLocks noGrp="1"/>
@@ -7519,7 +8019,233 @@
       </p:sp>
       <p:sp>
         <p:nvSpPr>
-          <p:cNvPr id="8" name="Title 1"/>
+          <p:cNvPr id="4" name="Rectangle 3"/>
+          <p:cNvSpPr/>
+          <p:nvPr/>
+        </p:nvSpPr>
+        <p:spPr>
+          <a:xfrm>
+            <a:off x="349416" y="1026916"/>
+            <a:ext cx="8360830" cy="2277547"/>
+          </a:xfrm>
+          <a:prstGeom prst="rect">
+            <a:avLst/>
+          </a:prstGeom>
+        </p:spPr>
+        <p:txBody>
+          <a:bodyPr wrap="square">
+            <a:spAutoFit/>
+          </a:bodyPr>
+          <a:lstStyle/>
+          <a:p>
+            <a:pPr algn="just"/>
+            <a:r>
+              <a:rPr lang="en-US" altLang="ko-KR" sz="2800" b="1" dirty="0" smtClean="0"/>
+              <a:t>How many websites use prefetching?</a:t>
+            </a:r>
+          </a:p>
+          <a:p>
+            <a:pPr marL="342882" indent="-342882" algn="just">
+              <a:buFontTx/>
+              <a:buChar char="-"/>
+            </a:pPr>
+            <a:r>
+              <a:rPr lang="en-US" altLang="ko-KR" sz="2400" dirty="0" smtClean="0">
+                <a:solidFill>
+                  <a:schemeClr val="tx1">
+                    <a:lumMod val="75000"/>
+                    <a:lumOff val="25000"/>
+                  </a:schemeClr>
+                </a:solidFill>
+              </a:rPr>
+              <a:t>Analyzed about 6,000 Alexa Top websites.</a:t>
+            </a:r>
+          </a:p>
+          <a:p>
+            <a:pPr marL="342882" indent="-342882" algn="just">
+              <a:buFontTx/>
+              <a:buChar char="-"/>
+            </a:pPr>
+            <a:r>
+              <a:rPr lang="en-US" altLang="ko-KR" sz="2400" dirty="0" smtClean="0">
+                <a:solidFill>
+                  <a:schemeClr val="tx1">
+                    <a:lumMod val="75000"/>
+                    <a:lumOff val="25000"/>
+                  </a:schemeClr>
+                </a:solidFill>
+              </a:rPr>
+              <a:t>About 60 websites use at least one of pre-fetch features –  </a:t>
+            </a:r>
+            <a:r>
+              <a:rPr lang="en-US" altLang="ko-KR" sz="2400" dirty="0" smtClean="0">
+                <a:solidFill>
+                  <a:schemeClr val="tx1">
+                    <a:lumMod val="75000"/>
+                    <a:lumOff val="25000"/>
+                  </a:schemeClr>
+                </a:solidFill>
+                <a:latin typeface="Consolas" charset="0"/>
+                <a:ea typeface="Consolas" charset="0"/>
+                <a:cs typeface="Consolas" charset="0"/>
+              </a:rPr>
+              <a:t> </a:t>
+            </a:r>
+            <a:r>
+              <a:rPr lang="en-US" altLang="ko-KR" sz="2000" dirty="0" smtClean="0">
+                <a:solidFill>
+                  <a:schemeClr val="tx1">
+                    <a:lumMod val="75000"/>
+                    <a:lumOff val="25000"/>
+                  </a:schemeClr>
+                </a:solidFill>
+                <a:latin typeface="Consolas" charset="0"/>
+                <a:ea typeface="Consolas" charset="0"/>
+                <a:cs typeface="Consolas" charset="0"/>
+              </a:rPr>
+              <a:t>{‘</a:t>
+            </a:r>
+            <a:r>
+              <a:rPr lang="en-US" altLang="ko-KR" sz="2000" dirty="0" err="1" smtClean="0">
+                <a:solidFill>
+                  <a:schemeClr val="tx1">
+                    <a:lumMod val="75000"/>
+                    <a:lumOff val="25000"/>
+                  </a:schemeClr>
+                </a:solidFill>
+                <a:latin typeface="Consolas" charset="0"/>
+                <a:ea typeface="Consolas" charset="0"/>
+                <a:cs typeface="Consolas" charset="0"/>
+              </a:rPr>
+              <a:t>dns-prefetch</a:t>
+            </a:r>
+            <a:r>
+              <a:rPr lang="en-US" altLang="ko-KR" sz="2000" dirty="0" smtClean="0">
+                <a:solidFill>
+                  <a:schemeClr val="tx1">
+                    <a:lumMod val="75000"/>
+                    <a:lumOff val="25000"/>
+                  </a:schemeClr>
+                </a:solidFill>
+                <a:latin typeface="Consolas" charset="0"/>
+                <a:ea typeface="Consolas" charset="0"/>
+                <a:cs typeface="Consolas" charset="0"/>
+              </a:rPr>
+              <a:t>’, ‘</a:t>
+            </a:r>
+            <a:r>
+              <a:rPr lang="en-US" altLang="ko-KR" sz="2000" dirty="0" err="1" smtClean="0">
+                <a:solidFill>
+                  <a:schemeClr val="tx1">
+                    <a:lumMod val="75000"/>
+                    <a:lumOff val="25000"/>
+                  </a:schemeClr>
+                </a:solidFill>
+                <a:latin typeface="Consolas" charset="0"/>
+                <a:ea typeface="Consolas" charset="0"/>
+                <a:cs typeface="Consolas" charset="0"/>
+              </a:rPr>
+              <a:t>prefetch</a:t>
+            </a:r>
+            <a:r>
+              <a:rPr lang="en-US" altLang="ko-KR" sz="2000" dirty="0" smtClean="0">
+                <a:solidFill>
+                  <a:schemeClr val="tx1">
+                    <a:lumMod val="75000"/>
+                    <a:lumOff val="25000"/>
+                  </a:schemeClr>
+                </a:solidFill>
+                <a:latin typeface="Consolas" charset="0"/>
+                <a:ea typeface="Consolas" charset="0"/>
+                <a:cs typeface="Consolas" charset="0"/>
+              </a:rPr>
+              <a:t>’, ‘next’, ‘</a:t>
+            </a:r>
+            <a:r>
+              <a:rPr lang="en-US" altLang="ko-KR" sz="2000" dirty="0" err="1" smtClean="0">
+                <a:solidFill>
+                  <a:schemeClr val="tx1">
+                    <a:lumMod val="75000"/>
+                    <a:lumOff val="25000"/>
+                  </a:schemeClr>
+                </a:solidFill>
+                <a:latin typeface="Consolas" charset="0"/>
+                <a:ea typeface="Consolas" charset="0"/>
+                <a:cs typeface="Consolas" charset="0"/>
+              </a:rPr>
+              <a:t>prerender</a:t>
+            </a:r>
+            <a:r>
+              <a:rPr lang="en-US" altLang="ko-KR" sz="2000" dirty="0" smtClean="0">
+                <a:solidFill>
+                  <a:schemeClr val="tx1">
+                    <a:lumMod val="75000"/>
+                    <a:lumOff val="25000"/>
+                  </a:schemeClr>
+                </a:solidFill>
+                <a:latin typeface="Consolas" charset="0"/>
+                <a:ea typeface="Consolas" charset="0"/>
+                <a:cs typeface="Consolas" charset="0"/>
+              </a:rPr>
+              <a:t>’}</a:t>
+            </a:r>
+            <a:endParaRPr lang="en-US" altLang="ko-KR" sz="2400" dirty="0" smtClean="0">
+              <a:solidFill>
+                <a:schemeClr val="tx1">
+                  <a:lumMod val="75000"/>
+                  <a:lumOff val="25000"/>
+                </a:schemeClr>
+              </a:solidFill>
+              <a:latin typeface="Consolas" charset="0"/>
+              <a:ea typeface="Consolas" charset="0"/>
+              <a:cs typeface="Consolas" charset="0"/>
+            </a:endParaRPr>
+          </a:p>
+          <a:p>
+            <a:pPr algn="just"/>
+            <a:r>
+              <a:rPr lang="en-US" altLang="ko-KR" dirty="0">
+                <a:solidFill>
+                  <a:schemeClr val="tx1">
+                    <a:lumMod val="75000"/>
+                    <a:lumOff val="25000"/>
+                  </a:schemeClr>
+                </a:solidFill>
+                <a:latin typeface="Calibri" charset="0"/>
+                <a:ea typeface="Calibri" charset="0"/>
+                <a:cs typeface="Calibri" charset="0"/>
+              </a:rPr>
+              <a:t> </a:t>
+            </a:r>
+            <a:endParaRPr lang="en-US" altLang="ko-KR" dirty="0" smtClean="0">
+              <a:solidFill>
+                <a:schemeClr val="tx1">
+                  <a:lumMod val="75000"/>
+                  <a:lumOff val="25000"/>
+                </a:schemeClr>
+              </a:solidFill>
+              <a:latin typeface="Calibri" charset="0"/>
+              <a:ea typeface="Calibri" charset="0"/>
+              <a:cs typeface="Calibri" charset="0"/>
+            </a:endParaRPr>
+          </a:p>
+          <a:p>
+            <a:pPr algn="just"/>
+            <a:r>
+              <a:rPr lang="en-US" altLang="ko-KR" sz="2800" b="1" dirty="0" smtClean="0"/>
+              <a:t>Some of the website</a:t>
+            </a:r>
+            <a:r>
+              <a:rPr lang="is-IS" altLang="ko-KR" sz="2800" b="1" dirty="0" smtClean="0"/>
+              <a:t>…</a:t>
+            </a:r>
+            <a:endParaRPr lang="en-US" altLang="ko-KR" sz="2800" b="1" dirty="0"/>
+          </a:p>
+        </p:txBody>
+      </p:sp>
+      <p:sp>
+        <p:nvSpPr>
+          <p:cNvPr id="6" name="Title 1"/>
           <p:cNvSpPr txBox="1">
             <a:spLocks/>
           </p:cNvSpPr>
@@ -7528,7 +8254,7 @@
         <p:spPr>
           <a:xfrm>
             <a:off x="409576" y="232031"/>
-            <a:ext cx="8626848" cy="734889"/>
+            <a:ext cx="9479494" cy="734889"/>
           </a:xfrm>
           <a:prstGeom prst="rect">
             <a:avLst/>
@@ -7563,16 +8289,835 @@
           <a:p>
             <a:r>
               <a:rPr lang="en-US" b="1" dirty="0" smtClean="0"/>
-              <a:t>Ongoing Works</a:t>
+              <a:t>Link Prefetching</a:t>
             </a:r>
             <a:endParaRPr lang="en-US" b="1" dirty="0"/>
           </a:p>
         </p:txBody>
       </p:sp>
+      <p:sp>
+        <p:nvSpPr>
+          <p:cNvPr id="8" name="TextBox 7"/>
+          <p:cNvSpPr txBox="1"/>
+          <p:nvPr/>
+        </p:nvSpPr>
+        <p:spPr>
+          <a:xfrm>
+            <a:off x="2614246" y="1266092"/>
+            <a:ext cx="184731" cy="369332"/>
+          </a:xfrm>
+          <a:prstGeom prst="rect">
+            <a:avLst/>
+          </a:prstGeom>
+          <a:noFill/>
+        </p:spPr>
+        <p:txBody>
+          <a:bodyPr wrap="none" rtlCol="0">
+            <a:spAutoFit/>
+          </a:bodyPr>
+          <a:lstStyle/>
+          <a:p>
+            <a:endParaRPr lang="en-US" dirty="0"/>
+          </a:p>
+        </p:txBody>
+      </p:sp>
+      <p:grpSp>
+        <p:nvGrpSpPr>
+          <p:cNvPr id="13" name="Group 12"/>
+          <p:cNvGrpSpPr/>
+          <p:nvPr/>
+        </p:nvGrpSpPr>
+        <p:grpSpPr>
+          <a:xfrm>
+            <a:off x="1344191" y="3077121"/>
+            <a:ext cx="6474139" cy="2986190"/>
+            <a:chOff x="1344191" y="3030229"/>
+            <a:chExt cx="6474139" cy="2986190"/>
+          </a:xfrm>
+        </p:grpSpPr>
+        <p:sp>
+          <p:nvSpPr>
+            <p:cNvPr id="11" name="Rectangle 10"/>
+            <p:cNvSpPr/>
+            <p:nvPr/>
+          </p:nvSpPr>
+          <p:spPr>
+            <a:xfrm>
+              <a:off x="1344191" y="3400318"/>
+              <a:ext cx="6474139" cy="2616101"/>
+            </a:xfrm>
+            <a:prstGeom prst="rect">
+              <a:avLst/>
+            </a:prstGeom>
+            <a:gradFill flip="none" rotWithShape="1">
+              <a:gsLst>
+                <a:gs pos="16000">
+                  <a:schemeClr val="bg1">
+                    <a:alpha val="13000"/>
+                  </a:schemeClr>
+                </a:gs>
+                <a:gs pos="0">
+                  <a:schemeClr val="bg1">
+                    <a:lumMod val="95000"/>
+                  </a:schemeClr>
+                </a:gs>
+                <a:gs pos="100000">
+                  <a:schemeClr val="bg1">
+                    <a:shade val="100000"/>
+                    <a:satMod val="115000"/>
+                  </a:schemeClr>
+                </a:gs>
+              </a:gsLst>
+              <a:path path="circle">
+                <a:fillToRect l="100000" t="100000"/>
+              </a:path>
+              <a:tileRect r="-100000" b="-100000"/>
+            </a:gradFill>
+            <a:ln w="19050">
+              <a:solidFill>
+                <a:srgbClr val="7A0019"/>
+              </a:solidFill>
+            </a:ln>
+          </p:spPr>
+          <p:txBody>
+            <a:bodyPr wrap="square">
+              <a:spAutoFit/>
+            </a:bodyPr>
+            <a:lstStyle/>
+            <a:p>
+              <a:r>
+                <a:rPr lang="en-US" sz="1600" dirty="0" smtClean="0">
+                  <a:solidFill>
+                    <a:schemeClr val="tx1">
+                      <a:lumMod val="75000"/>
+                      <a:lumOff val="25000"/>
+                    </a:schemeClr>
+                  </a:solidFill>
+                  <a:latin typeface="Consolas" charset="0"/>
+                  <a:ea typeface="Consolas" charset="0"/>
+                  <a:cs typeface="Consolas" charset="0"/>
+                </a:rPr>
+                <a:t>01: </a:t>
+              </a:r>
+              <a:r>
+                <a:rPr lang="en-US" sz="1600" dirty="0" err="1" smtClean="0">
+                  <a:solidFill>
+                    <a:schemeClr val="tx1">
+                      <a:lumMod val="75000"/>
+                      <a:lumOff val="25000"/>
+                    </a:schemeClr>
+                  </a:solidFill>
+                  <a:latin typeface="Consolas" charset="0"/>
+                  <a:ea typeface="Consolas" charset="0"/>
+                  <a:cs typeface="Consolas" charset="0"/>
+                </a:rPr>
+                <a:t>website_url</a:t>
+              </a:r>
+              <a:r>
+                <a:rPr lang="en-US" sz="1600" dirty="0" smtClean="0">
+                  <a:solidFill>
+                    <a:schemeClr val="tx1">
+                      <a:lumMod val="75000"/>
+                      <a:lumOff val="25000"/>
+                    </a:schemeClr>
+                  </a:solidFill>
+                  <a:latin typeface="Consolas" charset="0"/>
+                  <a:ea typeface="Consolas" charset="0"/>
+                  <a:cs typeface="Consolas" charset="0"/>
+                </a:rPr>
+                <a:t>, </a:t>
+              </a:r>
+              <a:r>
+                <a:rPr lang="en-US" sz="1600" dirty="0" err="1" smtClean="0">
+                  <a:solidFill>
+                    <a:schemeClr val="tx1">
+                      <a:lumMod val="75000"/>
+                      <a:lumOff val="25000"/>
+                    </a:schemeClr>
+                  </a:solidFill>
+                  <a:latin typeface="Consolas" charset="0"/>
+                  <a:ea typeface="Consolas" charset="0"/>
+                  <a:cs typeface="Consolas" charset="0"/>
+                </a:rPr>
+                <a:t>prefetch_types</a:t>
+              </a:r>
+              <a:endParaRPr lang="en-US" sz="1600" dirty="0" smtClean="0">
+                <a:solidFill>
+                  <a:schemeClr val="tx1">
+                    <a:lumMod val="75000"/>
+                    <a:lumOff val="25000"/>
+                  </a:schemeClr>
+                </a:solidFill>
+                <a:latin typeface="Consolas" charset="0"/>
+                <a:ea typeface="Consolas" charset="0"/>
+                <a:cs typeface="Consolas" charset="0"/>
+              </a:endParaRPr>
+            </a:p>
+            <a:p>
+              <a:r>
+                <a:rPr lang="en-US" sz="1600" dirty="0" smtClean="0">
+                  <a:solidFill>
+                    <a:schemeClr val="tx1">
+                      <a:lumMod val="75000"/>
+                      <a:lumOff val="25000"/>
+                    </a:schemeClr>
+                  </a:solidFill>
+                  <a:latin typeface="Consolas" charset="0"/>
+                  <a:ea typeface="Consolas" charset="0"/>
+                  <a:cs typeface="Consolas" charset="0"/>
+                </a:rPr>
+                <a:t>02: https</a:t>
+              </a:r>
+              <a:r>
+                <a:rPr lang="en-US" sz="1600" dirty="0">
+                  <a:solidFill>
+                    <a:schemeClr val="tx1">
+                      <a:lumMod val="75000"/>
+                      <a:lumOff val="25000"/>
+                    </a:schemeClr>
+                  </a:solidFill>
+                  <a:latin typeface="Consolas" charset="0"/>
+                  <a:ea typeface="Consolas" charset="0"/>
+                  <a:cs typeface="Consolas" charset="0"/>
+                </a:rPr>
+                <a:t>://www.yahoo.com</a:t>
+              </a:r>
+              <a:r>
+                <a:rPr lang="en-US" sz="1600" dirty="0" smtClean="0">
+                  <a:solidFill>
+                    <a:schemeClr val="tx1">
+                      <a:lumMod val="75000"/>
+                      <a:lumOff val="25000"/>
+                    </a:schemeClr>
+                  </a:solidFill>
+                  <a:latin typeface="Consolas" charset="0"/>
+                  <a:ea typeface="Consolas" charset="0"/>
+                  <a:cs typeface="Consolas" charset="0"/>
+                </a:rPr>
+                <a:t>/, </a:t>
+              </a:r>
+              <a:r>
+                <a:rPr lang="en-US" sz="1600" dirty="0" err="1" smtClean="0">
+                  <a:solidFill>
+                    <a:schemeClr val="tx1">
+                      <a:lumMod val="75000"/>
+                      <a:lumOff val="25000"/>
+                    </a:schemeClr>
+                  </a:solidFill>
+                  <a:latin typeface="Consolas" charset="0"/>
+                  <a:ea typeface="Consolas" charset="0"/>
+                  <a:cs typeface="Consolas" charset="0"/>
+                </a:rPr>
+                <a:t>dns-prefetch</a:t>
+              </a:r>
+              <a:endParaRPr lang="en-US" sz="1600" dirty="0" smtClean="0">
+                <a:solidFill>
+                  <a:schemeClr val="tx1">
+                    <a:lumMod val="75000"/>
+                    <a:lumOff val="25000"/>
+                  </a:schemeClr>
+                </a:solidFill>
+                <a:latin typeface="Consolas" charset="0"/>
+                <a:ea typeface="Consolas" charset="0"/>
+                <a:cs typeface="Consolas" charset="0"/>
+              </a:endParaRPr>
+            </a:p>
+            <a:p>
+              <a:r>
+                <a:rPr lang="en-US" sz="1600" dirty="0" smtClean="0">
+                  <a:solidFill>
+                    <a:schemeClr val="tx1">
+                      <a:lumMod val="75000"/>
+                      <a:lumOff val="25000"/>
+                    </a:schemeClr>
+                  </a:solidFill>
+                  <a:latin typeface="Consolas" charset="0"/>
+                  <a:ea typeface="Consolas" charset="0"/>
+                  <a:cs typeface="Consolas" charset="0"/>
+                </a:rPr>
+                <a:t>03: http</a:t>
+              </a:r>
+              <a:r>
+                <a:rPr lang="en-US" sz="1600" dirty="0">
+                  <a:solidFill>
+                    <a:schemeClr val="tx1">
+                      <a:lumMod val="75000"/>
+                      <a:lumOff val="25000"/>
+                    </a:schemeClr>
+                  </a:solidFill>
+                  <a:latin typeface="Consolas" charset="0"/>
+                  <a:ea typeface="Consolas" charset="0"/>
+                  <a:cs typeface="Consolas" charset="0"/>
+                </a:rPr>
+                <a:t>://www.baidu.com</a:t>
+              </a:r>
+              <a:r>
+                <a:rPr lang="en-US" sz="1600" dirty="0" smtClean="0">
+                  <a:solidFill>
+                    <a:schemeClr val="tx1">
+                      <a:lumMod val="75000"/>
+                      <a:lumOff val="25000"/>
+                    </a:schemeClr>
+                  </a:solidFill>
+                  <a:latin typeface="Consolas" charset="0"/>
+                  <a:ea typeface="Consolas" charset="0"/>
+                  <a:cs typeface="Consolas" charset="0"/>
+                </a:rPr>
+                <a:t>/, </a:t>
+              </a:r>
+              <a:r>
+                <a:rPr lang="en-US" sz="1600" dirty="0" err="1" smtClean="0">
+                  <a:solidFill>
+                    <a:schemeClr val="tx1">
+                      <a:lumMod val="75000"/>
+                      <a:lumOff val="25000"/>
+                    </a:schemeClr>
+                  </a:solidFill>
+                  <a:latin typeface="Consolas" charset="0"/>
+                  <a:ea typeface="Consolas" charset="0"/>
+                  <a:cs typeface="Consolas" charset="0"/>
+                </a:rPr>
+                <a:t>dns-prefetch</a:t>
+              </a:r>
+              <a:endParaRPr lang="en-US" sz="1600" dirty="0" smtClean="0">
+                <a:solidFill>
+                  <a:schemeClr val="tx1">
+                    <a:lumMod val="75000"/>
+                    <a:lumOff val="25000"/>
+                  </a:schemeClr>
+                </a:solidFill>
+                <a:latin typeface="Consolas" charset="0"/>
+                <a:ea typeface="Consolas" charset="0"/>
+                <a:cs typeface="Consolas" charset="0"/>
+              </a:endParaRPr>
+            </a:p>
+            <a:p>
+              <a:r>
+                <a:rPr lang="en-US" sz="1600" dirty="0" smtClean="0">
+                  <a:solidFill>
+                    <a:schemeClr val="tx1">
+                      <a:lumMod val="75000"/>
+                      <a:lumOff val="25000"/>
+                    </a:schemeClr>
+                  </a:solidFill>
+                  <a:latin typeface="Consolas" charset="0"/>
+                  <a:ea typeface="Consolas" charset="0"/>
+                  <a:cs typeface="Consolas" charset="0"/>
+                </a:rPr>
+                <a:t>04: http</a:t>
+              </a:r>
+              <a:r>
+                <a:rPr lang="en-US" sz="1600" dirty="0">
+                  <a:solidFill>
+                    <a:schemeClr val="tx1">
+                      <a:lumMod val="75000"/>
+                      <a:lumOff val="25000"/>
+                    </a:schemeClr>
+                  </a:solidFill>
+                  <a:latin typeface="Consolas" charset="0"/>
+                  <a:ea typeface="Consolas" charset="0"/>
+                  <a:cs typeface="Consolas" charset="0"/>
+                </a:rPr>
+                <a:t>://www.amazon.com</a:t>
+              </a:r>
+              <a:r>
+                <a:rPr lang="en-US" sz="1600" dirty="0" smtClean="0">
+                  <a:solidFill>
+                    <a:schemeClr val="tx1">
+                      <a:lumMod val="75000"/>
+                      <a:lumOff val="25000"/>
+                    </a:schemeClr>
+                  </a:solidFill>
+                  <a:latin typeface="Consolas" charset="0"/>
+                  <a:ea typeface="Consolas" charset="0"/>
+                  <a:cs typeface="Consolas" charset="0"/>
+                </a:rPr>
+                <a:t>/, </a:t>
+              </a:r>
+              <a:r>
+                <a:rPr lang="en-US" sz="1600" dirty="0" err="1" smtClean="0">
+                  <a:solidFill>
+                    <a:schemeClr val="tx1">
+                      <a:lumMod val="75000"/>
+                      <a:lumOff val="25000"/>
+                    </a:schemeClr>
+                  </a:solidFill>
+                  <a:latin typeface="Consolas" charset="0"/>
+                  <a:ea typeface="Consolas" charset="0"/>
+                  <a:cs typeface="Consolas" charset="0"/>
+                </a:rPr>
+                <a:t>dns-prefetch</a:t>
+              </a:r>
+              <a:endParaRPr lang="en-US" sz="1600" dirty="0" smtClean="0">
+                <a:solidFill>
+                  <a:schemeClr val="tx1">
+                    <a:lumMod val="75000"/>
+                    <a:lumOff val="25000"/>
+                  </a:schemeClr>
+                </a:solidFill>
+                <a:latin typeface="Consolas" charset="0"/>
+                <a:ea typeface="Consolas" charset="0"/>
+                <a:cs typeface="Consolas" charset="0"/>
+              </a:endParaRPr>
+            </a:p>
+            <a:p>
+              <a:r>
+                <a:rPr lang="en-US" sz="1600" dirty="0" smtClean="0">
+                  <a:solidFill>
+                    <a:schemeClr val="tx1">
+                      <a:lumMod val="75000"/>
+                      <a:lumOff val="25000"/>
+                    </a:schemeClr>
+                  </a:solidFill>
+                  <a:latin typeface="Consolas" charset="0"/>
+                  <a:ea typeface="Consolas" charset="0"/>
+                  <a:cs typeface="Consolas" charset="0"/>
+                </a:rPr>
+                <a:t>05: https</a:t>
+              </a:r>
+              <a:r>
+                <a:rPr lang="en-US" sz="1600" dirty="0">
+                  <a:solidFill>
+                    <a:schemeClr val="tx1">
+                      <a:lumMod val="75000"/>
+                      <a:lumOff val="25000"/>
+                    </a:schemeClr>
+                  </a:solidFill>
+                  <a:latin typeface="Consolas" charset="0"/>
+                  <a:ea typeface="Consolas" charset="0"/>
+                  <a:cs typeface="Consolas" charset="0"/>
+                </a:rPr>
+                <a:t>://wordpress.com</a:t>
+              </a:r>
+              <a:r>
+                <a:rPr lang="en-US" sz="1600" dirty="0" smtClean="0">
+                  <a:solidFill>
+                    <a:schemeClr val="tx1">
+                      <a:lumMod val="75000"/>
+                      <a:lumOff val="25000"/>
+                    </a:schemeClr>
+                  </a:solidFill>
+                  <a:latin typeface="Consolas" charset="0"/>
+                  <a:ea typeface="Consolas" charset="0"/>
+                  <a:cs typeface="Consolas" charset="0"/>
+                </a:rPr>
+                <a:t>/, </a:t>
+              </a:r>
+              <a:r>
+                <a:rPr lang="en-US" sz="1600" dirty="0" err="1" smtClean="0">
+                  <a:solidFill>
+                    <a:schemeClr val="tx1">
+                      <a:lumMod val="75000"/>
+                      <a:lumOff val="25000"/>
+                    </a:schemeClr>
+                  </a:solidFill>
+                  <a:latin typeface="Consolas" charset="0"/>
+                  <a:ea typeface="Consolas" charset="0"/>
+                  <a:cs typeface="Consolas" charset="0"/>
+                </a:rPr>
+                <a:t>dns-prefetch</a:t>
+              </a:r>
+              <a:endParaRPr lang="en-US" sz="1600" dirty="0" smtClean="0">
+                <a:solidFill>
+                  <a:schemeClr val="tx1">
+                    <a:lumMod val="75000"/>
+                    <a:lumOff val="25000"/>
+                  </a:schemeClr>
+                </a:solidFill>
+                <a:latin typeface="Consolas" charset="0"/>
+                <a:ea typeface="Consolas" charset="0"/>
+                <a:cs typeface="Consolas" charset="0"/>
+              </a:endParaRPr>
+            </a:p>
+            <a:p>
+              <a:r>
+                <a:rPr lang="en-US" sz="1600" dirty="0" smtClean="0">
+                  <a:solidFill>
+                    <a:schemeClr val="tx1">
+                      <a:lumMod val="75000"/>
+                      <a:lumOff val="25000"/>
+                    </a:schemeClr>
+                  </a:solidFill>
+                  <a:latin typeface="Consolas" charset="0"/>
+                  <a:ea typeface="Consolas" charset="0"/>
+                  <a:cs typeface="Consolas" charset="0"/>
+                </a:rPr>
+                <a:t>06: http</a:t>
+              </a:r>
+              <a:r>
+                <a:rPr lang="en-US" sz="1600" dirty="0">
+                  <a:solidFill>
+                    <a:schemeClr val="tx1">
+                      <a:lumMod val="75000"/>
+                      <a:lumOff val="25000"/>
+                    </a:schemeClr>
+                  </a:solidFill>
+                  <a:latin typeface="Consolas" charset="0"/>
+                  <a:ea typeface="Consolas" charset="0"/>
+                  <a:cs typeface="Consolas" charset="0"/>
+                </a:rPr>
+                <a:t>://www.amazon.co.jp</a:t>
+              </a:r>
+              <a:r>
+                <a:rPr lang="en-US" sz="1600" dirty="0" smtClean="0">
+                  <a:solidFill>
+                    <a:schemeClr val="tx1">
+                      <a:lumMod val="75000"/>
+                      <a:lumOff val="25000"/>
+                    </a:schemeClr>
+                  </a:solidFill>
+                  <a:latin typeface="Consolas" charset="0"/>
+                  <a:ea typeface="Consolas" charset="0"/>
+                  <a:cs typeface="Consolas" charset="0"/>
+                </a:rPr>
+                <a:t>/, </a:t>
+              </a:r>
+              <a:r>
+                <a:rPr lang="en-US" sz="1600" dirty="0" err="1" smtClean="0">
+                  <a:solidFill>
+                    <a:schemeClr val="tx1">
+                      <a:lumMod val="75000"/>
+                      <a:lumOff val="25000"/>
+                    </a:schemeClr>
+                  </a:solidFill>
+                  <a:latin typeface="Consolas" charset="0"/>
+                  <a:ea typeface="Consolas" charset="0"/>
+                  <a:cs typeface="Consolas" charset="0"/>
+                </a:rPr>
+                <a:t>dns-prefetch</a:t>
+              </a:r>
+              <a:endParaRPr lang="en-US" sz="1600" dirty="0" smtClean="0">
+                <a:solidFill>
+                  <a:schemeClr val="tx1">
+                    <a:lumMod val="75000"/>
+                    <a:lumOff val="25000"/>
+                  </a:schemeClr>
+                </a:solidFill>
+                <a:latin typeface="Consolas" charset="0"/>
+                <a:ea typeface="Consolas" charset="0"/>
+                <a:cs typeface="Consolas" charset="0"/>
+              </a:endParaRPr>
+            </a:p>
+            <a:p>
+              <a:r>
+                <a:rPr lang="en-US" sz="1600" dirty="0" smtClean="0">
+                  <a:solidFill>
+                    <a:schemeClr val="tx1">
+                      <a:lumMod val="75000"/>
+                      <a:lumOff val="25000"/>
+                    </a:schemeClr>
+                  </a:solidFill>
+                  <a:latin typeface="Consolas" charset="0"/>
+                  <a:ea typeface="Consolas" charset="0"/>
+                  <a:cs typeface="Consolas" charset="0"/>
+                </a:rPr>
+                <a:t>07: https</a:t>
+              </a:r>
+              <a:r>
+                <a:rPr lang="en-US" sz="1600" dirty="0">
+                  <a:solidFill>
+                    <a:schemeClr val="tx1">
+                      <a:lumMod val="75000"/>
+                      <a:lumOff val="25000"/>
+                    </a:schemeClr>
+                  </a:solidFill>
+                  <a:latin typeface="Consolas" charset="0"/>
+                  <a:ea typeface="Consolas" charset="0"/>
+                  <a:cs typeface="Consolas" charset="0"/>
+                </a:rPr>
+                <a:t>://</a:t>
+              </a:r>
+              <a:r>
+                <a:rPr lang="en-US" sz="1600" dirty="0" err="1" smtClean="0">
+                  <a:solidFill>
+                    <a:schemeClr val="tx1">
+                      <a:lumMod val="75000"/>
+                      <a:lumOff val="25000"/>
+                    </a:schemeClr>
+                  </a:solidFill>
+                  <a:latin typeface="Consolas" charset="0"/>
+                  <a:ea typeface="Consolas" charset="0"/>
+                  <a:cs typeface="Consolas" charset="0"/>
+                </a:rPr>
+                <a:t>www.tmall.com</a:t>
+              </a:r>
+              <a:r>
+                <a:rPr lang="en-US" sz="1600" dirty="0" smtClean="0">
+                  <a:solidFill>
+                    <a:schemeClr val="tx1">
+                      <a:lumMod val="75000"/>
+                      <a:lumOff val="25000"/>
+                    </a:schemeClr>
+                  </a:solidFill>
+                  <a:latin typeface="Consolas" charset="0"/>
+                  <a:ea typeface="Consolas" charset="0"/>
+                  <a:cs typeface="Consolas" charset="0"/>
+                </a:rPr>
+                <a:t>/, </a:t>
+              </a:r>
+              <a:r>
+                <a:rPr lang="en-US" sz="1600" dirty="0" err="1" smtClean="0">
+                  <a:solidFill>
+                    <a:schemeClr val="tx1">
+                      <a:lumMod val="75000"/>
+                      <a:lumOff val="25000"/>
+                    </a:schemeClr>
+                  </a:solidFill>
+                  <a:latin typeface="Consolas" charset="0"/>
+                  <a:ea typeface="Consolas" charset="0"/>
+                  <a:cs typeface="Consolas" charset="0"/>
+                </a:rPr>
+                <a:t>dns-prefetch</a:t>
+              </a:r>
+              <a:endParaRPr lang="en-US" sz="1600" dirty="0" smtClean="0">
+                <a:solidFill>
+                  <a:schemeClr val="tx1">
+                    <a:lumMod val="75000"/>
+                    <a:lumOff val="25000"/>
+                  </a:schemeClr>
+                </a:solidFill>
+                <a:latin typeface="Consolas" charset="0"/>
+                <a:ea typeface="Consolas" charset="0"/>
+                <a:cs typeface="Consolas" charset="0"/>
+              </a:endParaRPr>
+            </a:p>
+            <a:p>
+              <a:r>
+                <a:rPr lang="en-US" sz="1600" dirty="0" smtClean="0">
+                  <a:solidFill>
+                    <a:schemeClr val="tx1">
+                      <a:lumMod val="75000"/>
+                      <a:lumOff val="25000"/>
+                    </a:schemeClr>
+                  </a:solidFill>
+                  <a:latin typeface="Consolas" charset="0"/>
+                  <a:ea typeface="Consolas" charset="0"/>
+                  <a:cs typeface="Consolas" charset="0"/>
+                </a:rPr>
+                <a:t>08: http</a:t>
+              </a:r>
+              <a:r>
+                <a:rPr lang="en-US" sz="1600" dirty="0">
+                  <a:solidFill>
+                    <a:schemeClr val="tx1">
+                      <a:lumMod val="75000"/>
+                      <a:lumOff val="25000"/>
+                    </a:schemeClr>
+                  </a:solidFill>
+                  <a:latin typeface="Consolas" charset="0"/>
+                  <a:ea typeface="Consolas" charset="0"/>
+                  <a:cs typeface="Consolas" charset="0"/>
+                </a:rPr>
+                <a:t>://www.hao123.com</a:t>
+              </a:r>
+              <a:r>
+                <a:rPr lang="en-US" sz="1600" dirty="0" smtClean="0">
+                  <a:solidFill>
+                    <a:schemeClr val="tx1">
+                      <a:lumMod val="75000"/>
+                      <a:lumOff val="25000"/>
+                    </a:schemeClr>
+                  </a:solidFill>
+                  <a:latin typeface="Consolas" charset="0"/>
+                  <a:ea typeface="Consolas" charset="0"/>
+                  <a:cs typeface="Consolas" charset="0"/>
+                </a:rPr>
+                <a:t>/, </a:t>
+              </a:r>
+              <a:r>
+                <a:rPr lang="en-US" sz="1600" dirty="0" err="1" smtClean="0">
+                  <a:solidFill>
+                    <a:schemeClr val="tx1">
+                      <a:lumMod val="75000"/>
+                      <a:lumOff val="25000"/>
+                    </a:schemeClr>
+                  </a:solidFill>
+                  <a:latin typeface="Consolas" charset="0"/>
+                  <a:ea typeface="Consolas" charset="0"/>
+                  <a:cs typeface="Consolas" charset="0"/>
+                </a:rPr>
+                <a:t>dns-prefetch</a:t>
+              </a:r>
+              <a:endParaRPr lang="en-US" sz="1600" dirty="0" smtClean="0">
+                <a:solidFill>
+                  <a:schemeClr val="tx1">
+                    <a:lumMod val="75000"/>
+                    <a:lumOff val="25000"/>
+                  </a:schemeClr>
+                </a:solidFill>
+                <a:latin typeface="Consolas" charset="0"/>
+                <a:ea typeface="Consolas" charset="0"/>
+                <a:cs typeface="Consolas" charset="0"/>
+              </a:endParaRPr>
+            </a:p>
+            <a:p>
+              <a:r>
+                <a:rPr lang="en-US" sz="1600" dirty="0" smtClean="0">
+                  <a:solidFill>
+                    <a:schemeClr val="tx1">
+                      <a:lumMod val="75000"/>
+                      <a:lumOff val="25000"/>
+                    </a:schemeClr>
+                  </a:solidFill>
+                  <a:latin typeface="Consolas" charset="0"/>
+                  <a:ea typeface="Consolas" charset="0"/>
+                  <a:cs typeface="Consolas" charset="0"/>
+                </a:rPr>
+                <a:t>09: http</a:t>
+              </a:r>
+              <a:r>
+                <a:rPr lang="en-US" sz="1600" dirty="0">
+                  <a:solidFill>
+                    <a:schemeClr val="tx1">
+                      <a:lumMod val="75000"/>
+                      <a:lumOff val="25000"/>
+                    </a:schemeClr>
+                  </a:solidFill>
+                  <a:latin typeface="Consolas" charset="0"/>
+                  <a:ea typeface="Consolas" charset="0"/>
+                  <a:cs typeface="Consolas" charset="0"/>
+                </a:rPr>
+                <a:t>://</a:t>
+              </a:r>
+              <a:r>
+                <a:rPr lang="en-US" sz="1600" dirty="0" err="1" smtClean="0">
+                  <a:solidFill>
+                    <a:schemeClr val="tx1">
+                      <a:lumMod val="75000"/>
+                      <a:lumOff val="25000"/>
+                    </a:schemeClr>
+                  </a:solidFill>
+                  <a:latin typeface="Consolas" charset="0"/>
+                  <a:ea typeface="Consolas" charset="0"/>
+                  <a:cs typeface="Consolas" charset="0"/>
+                </a:rPr>
+                <a:t>xhamster.com</a:t>
+              </a:r>
+              <a:r>
+                <a:rPr lang="en-US" sz="1600" dirty="0" smtClean="0">
+                  <a:solidFill>
+                    <a:schemeClr val="tx1">
+                      <a:lumMod val="75000"/>
+                      <a:lumOff val="25000"/>
+                    </a:schemeClr>
+                  </a:solidFill>
+                  <a:latin typeface="Consolas" charset="0"/>
+                  <a:ea typeface="Consolas" charset="0"/>
+                  <a:cs typeface="Consolas" charset="0"/>
+                </a:rPr>
+                <a:t>/,"</a:t>
+              </a:r>
+              <a:r>
+                <a:rPr lang="en-US" sz="1600" dirty="0" err="1" smtClean="0">
+                  <a:solidFill>
+                    <a:schemeClr val="tx1">
+                      <a:lumMod val="75000"/>
+                      <a:lumOff val="25000"/>
+                    </a:schemeClr>
+                  </a:solidFill>
+                  <a:latin typeface="Consolas" charset="0"/>
+                  <a:ea typeface="Consolas" charset="0"/>
+                  <a:cs typeface="Consolas" charset="0"/>
+                </a:rPr>
+                <a:t>dns-prefetch,next</a:t>
+              </a:r>
+              <a:r>
+                <a:rPr lang="en-US" sz="1600" dirty="0" smtClean="0">
+                  <a:solidFill>
+                    <a:schemeClr val="tx1">
+                      <a:lumMod val="75000"/>
+                      <a:lumOff val="25000"/>
+                    </a:schemeClr>
+                  </a:solidFill>
+                  <a:latin typeface="Consolas" charset="0"/>
+                  <a:ea typeface="Consolas" charset="0"/>
+                  <a:cs typeface="Consolas" charset="0"/>
+                </a:rPr>
+                <a:t>”</a:t>
+              </a:r>
+            </a:p>
+            <a:p>
+              <a:r>
+                <a:rPr lang="en-US" sz="1600" dirty="0" smtClean="0">
+                  <a:solidFill>
+                    <a:schemeClr val="tx1">
+                      <a:lumMod val="75000"/>
+                      <a:lumOff val="25000"/>
+                    </a:schemeClr>
+                  </a:solidFill>
+                  <a:latin typeface="Consolas" charset="0"/>
+                  <a:ea typeface="Consolas" charset="0"/>
+                  <a:cs typeface="Consolas" charset="0"/>
+                </a:rPr>
+                <a:t>10: ...</a:t>
+              </a:r>
+            </a:p>
+          </p:txBody>
+        </p:sp>
+        <p:sp>
+          <p:nvSpPr>
+            <p:cNvPr id="12" name="Rectangle 11"/>
+            <p:cNvSpPr/>
+            <p:nvPr/>
+          </p:nvSpPr>
+          <p:spPr>
+            <a:xfrm>
+              <a:off x="4594371" y="3030229"/>
+              <a:ext cx="3223959" cy="369332"/>
+            </a:xfrm>
+            <a:prstGeom prst="rect">
+              <a:avLst/>
+            </a:prstGeom>
+            <a:solidFill>
+              <a:srgbClr val="FFCC33"/>
+            </a:solidFill>
+            <a:ln w="19050">
+              <a:solidFill>
+                <a:srgbClr val="7A0019"/>
+              </a:solidFill>
+            </a:ln>
+          </p:spPr>
+          <p:txBody>
+            <a:bodyPr wrap="none">
+              <a:spAutoFit/>
+            </a:bodyPr>
+            <a:lstStyle/>
+            <a:p>
+              <a:r>
+                <a:rPr lang="en-US" dirty="0" err="1">
+                  <a:solidFill>
+                    <a:srgbClr val="7A0019"/>
+                  </a:solidFill>
+                  <a:latin typeface="Consolas" charset="0"/>
+                  <a:ea typeface="Consolas" charset="0"/>
+                  <a:cs typeface="Consolas" charset="0"/>
+                </a:rPr>
+                <a:t>p</a:t>
+              </a:r>
+              <a:r>
+                <a:rPr lang="en-US" dirty="0" err="1" smtClean="0">
+                  <a:solidFill>
+                    <a:srgbClr val="7A0019"/>
+                  </a:solidFill>
+                  <a:latin typeface="Consolas" charset="0"/>
+                  <a:ea typeface="Consolas" charset="0"/>
+                  <a:cs typeface="Consolas" charset="0"/>
+                </a:rPr>
+                <a:t>refetching_websites.csv</a:t>
+              </a:r>
+              <a:endParaRPr lang="en-US" dirty="0">
+                <a:solidFill>
+                  <a:srgbClr val="7A0019"/>
+                </a:solidFill>
+              </a:endParaRPr>
+            </a:p>
+          </p:txBody>
+        </p:sp>
+      </p:grpSp>
     </p:spTree>
     <p:extLst>
       <p:ext uri="{BB962C8B-B14F-4D97-AF65-F5344CB8AC3E}">
-        <p14:creationId xmlns:p14="http://schemas.microsoft.com/office/powerpoint/2010/main" val="1482431112"/>
+        <p14:creationId xmlns:p14="http://schemas.microsoft.com/office/powerpoint/2010/main" val="1672954701"/>
       </p:ext>
     </p:extLst>
   </p:cSld>
@@ -7608,39 +9153,388 @@
       </p:grpSpPr>
       <p:sp>
         <p:nvSpPr>
-          <p:cNvPr id="2" name="Title 1"/>
+          <p:cNvPr id="3" name="Slide Number Placeholder 2"/>
           <p:cNvSpPr>
             <a:spLocks noGrp="1"/>
           </p:cNvSpPr>
           <p:nvPr>
-            <p:ph type="title"/>
+            <p:ph type="sldNum" sz="quarter" idx="4294967295"/>
           </p:nvPr>
         </p:nvSpPr>
-        <p:spPr/>
+        <p:spPr>
+          <a:xfrm>
+            <a:off x="-237705" y="6459786"/>
+            <a:ext cx="984019" cy="365125"/>
+          </a:xfrm>
+        </p:spPr>
         <p:txBody>
           <a:bodyPr/>
           <a:lstStyle/>
           <a:p>
-            <a:endParaRPr lang="en-US"/>
-          </a:p>
-        </p:txBody>
-      </p:sp>
-      <p:sp>
-        <p:nvSpPr>
-          <p:cNvPr id="3" name="Content Placeholder 2"/>
+            <a:fld id="{629637A9-119A-49DA-BD12-AAC58B377D80}" type="slidenum">
+              <a:rPr lang="en-US" smtClean="0"/>
+              <a:t>14</a:t>
+            </a:fld>
+            <a:endParaRPr lang="en-US" dirty="0"/>
+          </a:p>
+        </p:txBody>
+      </p:sp>
+      <p:sp>
+        <p:nvSpPr>
+          <p:cNvPr id="4" name="Rectangle 3"/>
+          <p:cNvSpPr/>
+          <p:nvPr/>
+        </p:nvSpPr>
+        <p:spPr>
+          <a:xfrm>
+            <a:off x="349416" y="1026916"/>
+            <a:ext cx="8360830" cy="523220"/>
+          </a:xfrm>
+          <a:prstGeom prst="rect">
+            <a:avLst/>
+          </a:prstGeom>
+        </p:spPr>
+        <p:txBody>
+          <a:bodyPr wrap="square">
+            <a:spAutoFit/>
+          </a:bodyPr>
+          <a:lstStyle/>
+          <a:p>
+            <a:pPr algn="just"/>
+            <a:r>
+              <a:rPr lang="en-US" altLang="ko-KR" sz="2800" b="1" dirty="0" smtClean="0"/>
+              <a:t>How does it look like?</a:t>
+            </a:r>
+            <a:endParaRPr lang="en-US" altLang="ko-KR" sz="2800" b="1" dirty="0"/>
+          </a:p>
+        </p:txBody>
+      </p:sp>
+      <p:sp>
+        <p:nvSpPr>
+          <p:cNvPr id="6" name="Title 1"/>
+          <p:cNvSpPr txBox="1">
+            <a:spLocks/>
+          </p:cNvSpPr>
+          <p:nvPr/>
+        </p:nvSpPr>
+        <p:spPr>
+          <a:xfrm>
+            <a:off x="409576" y="232031"/>
+            <a:ext cx="9479494" cy="734889"/>
+          </a:xfrm>
+          <a:prstGeom prst="rect">
+            <a:avLst/>
+          </a:prstGeom>
+        </p:spPr>
+        <p:txBody>
+          <a:bodyPr vert="horz" lIns="91440" tIns="45720" rIns="91440" bIns="45720" rtlCol="0" anchor="b">
+            <a:normAutofit/>
+          </a:bodyPr>
+          <a:lstStyle>
+            <a:lvl1pPr algn="l" defTabSz="914400" rtl="0" eaLnBrk="1" latinLnBrk="0" hangingPunct="1">
+              <a:lnSpc>
+                <a:spcPct val="85000"/>
+              </a:lnSpc>
+              <a:spcBef>
+                <a:spcPct val="0"/>
+              </a:spcBef>
+              <a:buNone/>
+              <a:defRPr sz="4800" kern="1200" spc="-50" baseline="0">
+                <a:solidFill>
+                  <a:schemeClr val="tx1">
+                    <a:lumMod val="75000"/>
+                    <a:lumOff val="25000"/>
+                  </a:schemeClr>
+                </a:solidFill>
+                <a:latin typeface="+mj-lt"/>
+                <a:ea typeface="+mj-ea"/>
+                <a:cs typeface="+mj-cs"/>
+              </a:defRPr>
+            </a:lvl1pPr>
+          </a:lstStyle>
+          <a:p>
+            <a:r>
+              <a:rPr lang="en-US" b="1" dirty="0" smtClean="0"/>
+              <a:t>Link Prefetching</a:t>
+            </a:r>
+            <a:endParaRPr lang="en-US" b="1" dirty="0"/>
+          </a:p>
+        </p:txBody>
+      </p:sp>
+      <p:sp>
+        <p:nvSpPr>
+          <p:cNvPr id="8" name="TextBox 7"/>
+          <p:cNvSpPr txBox="1"/>
+          <p:nvPr/>
+        </p:nvSpPr>
+        <p:spPr>
+          <a:xfrm>
+            <a:off x="2614246" y="1266092"/>
+            <a:ext cx="184731" cy="369332"/>
+          </a:xfrm>
+          <a:prstGeom prst="rect">
+            <a:avLst/>
+          </a:prstGeom>
+          <a:noFill/>
+        </p:spPr>
+        <p:txBody>
+          <a:bodyPr wrap="none" rtlCol="0">
+            <a:spAutoFit/>
+          </a:bodyPr>
+          <a:lstStyle/>
+          <a:p>
+            <a:endParaRPr lang="en-US" dirty="0"/>
+          </a:p>
+        </p:txBody>
+      </p:sp>
+      <p:pic>
+        <p:nvPicPr>
+          <p:cNvPr id="9" name="Picture 8"/>
+          <p:cNvPicPr>
+            <a:picLocks noChangeAspect="1"/>
+          </p:cNvPicPr>
+          <p:nvPr/>
+        </p:nvPicPr>
+        <p:blipFill rotWithShape="1">
+          <a:blip r:embed="rId3"/>
+          <a:srcRect b="5826"/>
+          <a:stretch/>
+        </p:blipFill>
+        <p:spPr>
+          <a:xfrm>
+            <a:off x="349416" y="1561859"/>
+            <a:ext cx="8405997" cy="4358295"/>
+          </a:xfrm>
+          <a:prstGeom prst="rect">
+            <a:avLst/>
+          </a:prstGeom>
+        </p:spPr>
+      </p:pic>
+      <p:sp>
+        <p:nvSpPr>
+          <p:cNvPr id="12" name="Rectangle 11"/>
+          <p:cNvSpPr/>
+          <p:nvPr/>
+        </p:nvSpPr>
+        <p:spPr>
+          <a:xfrm>
+            <a:off x="7075539" y="1023975"/>
+            <a:ext cx="1548501" cy="646331"/>
+          </a:xfrm>
+          <a:prstGeom prst="rect">
+            <a:avLst/>
+          </a:prstGeom>
+        </p:spPr>
+        <p:txBody>
+          <a:bodyPr wrap="none">
+            <a:spAutoFit/>
+          </a:bodyPr>
+          <a:lstStyle/>
+          <a:p>
+            <a:r>
+              <a:rPr lang="en-US" dirty="0" smtClean="0">
+                <a:solidFill>
+                  <a:srgbClr val="C00000"/>
+                </a:solidFill>
+              </a:rPr>
+              <a:t>-- pre-fetch off</a:t>
+            </a:r>
+          </a:p>
+          <a:p>
+            <a:r>
+              <a:rPr lang="en-US" dirty="0" smtClean="0">
+                <a:solidFill>
+                  <a:srgbClr val="0070C0"/>
+                </a:solidFill>
+              </a:rPr>
+              <a:t>-- pre-fetch on</a:t>
+            </a:r>
+            <a:endParaRPr lang="en-US" dirty="0">
+              <a:solidFill>
+                <a:srgbClr val="0070C0"/>
+              </a:solidFill>
+            </a:endParaRPr>
+          </a:p>
+        </p:txBody>
+      </p:sp>
+      <p:sp>
+        <p:nvSpPr>
+          <p:cNvPr id="13" name="Rectangle 12"/>
+          <p:cNvSpPr/>
+          <p:nvPr/>
+        </p:nvSpPr>
+        <p:spPr>
+          <a:xfrm>
+            <a:off x="7884958" y="5779478"/>
+            <a:ext cx="1111202" cy="369332"/>
+          </a:xfrm>
+          <a:prstGeom prst="rect">
+            <a:avLst/>
+          </a:prstGeom>
+        </p:spPr>
+        <p:txBody>
+          <a:bodyPr wrap="none">
+            <a:spAutoFit/>
+          </a:bodyPr>
+          <a:lstStyle/>
+          <a:p>
+            <a:r>
+              <a:rPr lang="en-US" i="1" dirty="0"/>
+              <a:t>t</a:t>
+            </a:r>
+            <a:r>
+              <a:rPr lang="en-US" i="1" dirty="0" smtClean="0"/>
+              <a:t>ime (sec)</a:t>
+            </a:r>
+            <a:endParaRPr lang="en-US" i="1" dirty="0"/>
+          </a:p>
+        </p:txBody>
+      </p:sp>
+      <p:sp>
+        <p:nvSpPr>
+          <p:cNvPr id="14" name="Rectangle 13"/>
+          <p:cNvSpPr/>
+          <p:nvPr/>
+        </p:nvSpPr>
+        <p:spPr>
+          <a:xfrm>
+            <a:off x="96946" y="1714632"/>
+            <a:ext cx="1060996" cy="369332"/>
+          </a:xfrm>
+          <a:prstGeom prst="rect">
+            <a:avLst/>
+          </a:prstGeom>
+        </p:spPr>
+        <p:txBody>
+          <a:bodyPr wrap="none">
+            <a:spAutoFit/>
+          </a:bodyPr>
+          <a:lstStyle/>
+          <a:p>
+            <a:r>
+              <a:rPr lang="en-US" i="1" dirty="0" smtClean="0"/>
+              <a:t># packets</a:t>
+            </a:r>
+            <a:endParaRPr lang="en-US" i="1" dirty="0"/>
+          </a:p>
+        </p:txBody>
+      </p:sp>
+      <p:sp>
+        <p:nvSpPr>
+          <p:cNvPr id="15" name="Rectangle 14"/>
+          <p:cNvSpPr/>
+          <p:nvPr/>
+        </p:nvSpPr>
+        <p:spPr>
+          <a:xfrm>
+            <a:off x="0" y="5964144"/>
+            <a:ext cx="2957605" cy="369332"/>
+          </a:xfrm>
+          <a:prstGeom prst="rect">
+            <a:avLst/>
+          </a:prstGeom>
+        </p:spPr>
+        <p:txBody>
+          <a:bodyPr wrap="none">
+            <a:spAutoFit/>
+          </a:bodyPr>
+          <a:lstStyle/>
+          <a:p>
+            <a:r>
+              <a:rPr lang="en-US" i="1" dirty="0" smtClean="0">
+                <a:solidFill>
+                  <a:schemeClr val="tx1">
+                    <a:lumMod val="65000"/>
+                    <a:lumOff val="35000"/>
+                  </a:schemeClr>
+                </a:solidFill>
+              </a:rPr>
+              <a:t>Packets from </a:t>
+            </a:r>
+            <a:r>
+              <a:rPr lang="en-US" i="1" dirty="0" err="1" smtClean="0">
+                <a:solidFill>
+                  <a:schemeClr val="tx1">
+                    <a:lumMod val="65000"/>
+                    <a:lumOff val="35000"/>
+                  </a:schemeClr>
+                </a:solidFill>
+              </a:rPr>
+              <a:t>www.wired.com</a:t>
+            </a:r>
+            <a:endParaRPr lang="en-US" i="1" dirty="0">
+              <a:solidFill>
+                <a:schemeClr val="tx1">
+                  <a:lumMod val="65000"/>
+                  <a:lumOff val="35000"/>
+                </a:schemeClr>
+              </a:solidFill>
+            </a:endParaRPr>
+          </a:p>
+        </p:txBody>
+      </p:sp>
+    </p:spTree>
+    <p:extLst>
+      <p:ext uri="{BB962C8B-B14F-4D97-AF65-F5344CB8AC3E}">
+        <p14:creationId xmlns:p14="http://schemas.microsoft.com/office/powerpoint/2010/main" val="446832417"/>
+      </p:ext>
+    </p:extLst>
+  </p:cSld>
+  <p:clrMapOvr>
+    <a:masterClrMapping/>
+  </p:clrMapOvr>
+  <p:timing>
+    <p:tnLst>
+      <p:par>
+        <p:cTn id="1" dur="indefinite" restart="never" nodeType="tmRoot"/>
+      </p:par>
+    </p:tnLst>
+  </p:timing>
+</p:sld>
+</file>
+
+<file path=ppt/slides/slide15.xml><?xml version="1.0" encoding="utf-8"?>
+<p:sld xmlns:a="http://schemas.openxmlformats.org/drawingml/2006/main" xmlns:r="http://schemas.openxmlformats.org/officeDocument/2006/relationships" xmlns:p="http://schemas.openxmlformats.org/presentationml/2006/main">
+  <p:cSld>
+    <p:spTree>
+      <p:nvGrpSpPr>
+        <p:cNvPr id="1" name=""/>
+        <p:cNvGrpSpPr/>
+        <p:nvPr/>
+      </p:nvGrpSpPr>
+      <p:grpSpPr>
+        <a:xfrm>
+          <a:off x="0" y="0"/>
+          <a:ext cx="0" cy="0"/>
+          <a:chOff x="0" y="0"/>
+          <a:chExt cx="0" cy="0"/>
+        </a:xfrm>
+      </p:grpSpPr>
+      <p:sp>
+        <p:nvSpPr>
+          <p:cNvPr id="3" name="Slide Number Placeholder 2"/>
           <p:cNvSpPr>
             <a:spLocks noGrp="1"/>
           </p:cNvSpPr>
           <p:nvPr>
-            <p:ph idx="1"/>
+            <p:ph type="sldNum" sz="quarter" idx="4294967295"/>
           </p:nvPr>
         </p:nvSpPr>
-        <p:spPr/>
+        <p:spPr>
+          <a:xfrm>
+            <a:off x="-237705" y="6459786"/>
+            <a:ext cx="984019" cy="365125"/>
+          </a:xfrm>
+        </p:spPr>
         <p:txBody>
           <a:bodyPr/>
           <a:lstStyle/>
           <a:p>
-            <a:endParaRPr lang="en-US"/>
+            <a:fld id="{629637A9-119A-49DA-BD12-AAC58B377D80}" type="slidenum">
+              <a:rPr lang="en-US" smtClean="0"/>
+              <a:t>15</a:t>
+            </a:fld>
+            <a:endParaRPr lang="en-US" dirty="0"/>
           </a:p>
         </p:txBody>
       </p:sp>
@@ -7652,56 +9546,244 @@
         </p:nvSpPr>
         <p:spPr>
           <a:xfrm>
-            <a:off x="0" y="0"/>
-            <a:ext cx="9144000" cy="6858000"/>
+            <a:off x="349416" y="1026916"/>
+            <a:ext cx="8360830" cy="3970318"/>
           </a:xfrm>
           <a:prstGeom prst="rect">
             <a:avLst/>
           </a:prstGeom>
-          <a:solidFill>
-            <a:schemeClr val="tx1"/>
-          </a:solidFill>
-          <a:ln>
-            <a:solidFill>
-              <a:schemeClr val="tx1"/>
-            </a:solidFill>
-          </a:ln>
-        </p:spPr>
-        <p:style>
-          <a:lnRef idx="2">
-            <a:schemeClr val="accent1">
-              <a:shade val="50000"/>
-            </a:schemeClr>
-          </a:lnRef>
-          <a:fillRef idx="1">
-            <a:schemeClr val="accent1"/>
-          </a:fillRef>
-          <a:effectRef idx="0">
-            <a:schemeClr val="accent1"/>
-          </a:effectRef>
-          <a:fontRef idx="minor">
-            <a:schemeClr val="lt1"/>
-          </a:fontRef>
-        </p:style>
-        <p:txBody>
-          <a:bodyPr rtlCol="0" anchor="ctr"/>
-          <a:lstStyle/>
-          <a:p>
-            <a:pPr algn="ctr"/>
-            <a:endParaRPr lang="en-US"/>
-          </a:p>
-        </p:txBody>
-      </p:sp>
-      <p:sp>
-        <p:nvSpPr>
-          <p:cNvPr id="5" name="TextBox 4"/>
+        </p:spPr>
+        <p:txBody>
+          <a:bodyPr wrap="square">
+            <a:spAutoFit/>
+          </a:bodyPr>
+          <a:lstStyle/>
+          <a:p>
+            <a:pPr algn="just"/>
+            <a:r>
+              <a:rPr lang="en-US" altLang="ko-KR" sz="2800" b="1" dirty="0" smtClean="0"/>
+              <a:t>RQ1</a:t>
+            </a:r>
+            <a:endParaRPr lang="en-US" altLang="ko-KR" sz="2400" dirty="0" smtClean="0">
+              <a:solidFill>
+                <a:schemeClr val="tx1">
+                  <a:lumMod val="75000"/>
+                  <a:lumOff val="25000"/>
+                </a:schemeClr>
+              </a:solidFill>
+              <a:latin typeface="Calibri" charset="0"/>
+              <a:ea typeface="Calibri" charset="0"/>
+              <a:cs typeface="Calibri" charset="0"/>
+            </a:endParaRPr>
+          </a:p>
+          <a:p>
+            <a:pPr marL="342900" indent="-342900" algn="just">
+              <a:buFontTx/>
+              <a:buChar char="-"/>
+            </a:pPr>
+            <a:r>
+              <a:rPr lang="en-US" altLang="ko-KR" sz="2400" dirty="0" smtClean="0">
+                <a:solidFill>
+                  <a:schemeClr val="tx1">
+                    <a:lumMod val="75000"/>
+                    <a:lumOff val="25000"/>
+                  </a:schemeClr>
+                </a:solidFill>
+                <a:latin typeface="Calibri" charset="0"/>
+                <a:ea typeface="Calibri" charset="0"/>
+                <a:cs typeface="Calibri" charset="0"/>
+              </a:rPr>
+              <a:t>Does prefetching itself provide an extra degree of defense?</a:t>
+            </a:r>
+          </a:p>
+          <a:p>
+            <a:pPr marL="342900" indent="-342900" algn="just">
+              <a:buFontTx/>
+              <a:buChar char="-"/>
+            </a:pPr>
+            <a:endParaRPr lang="en-US" altLang="ko-KR" sz="2400" dirty="0" smtClean="0">
+              <a:solidFill>
+                <a:schemeClr val="tx1">
+                  <a:lumMod val="75000"/>
+                  <a:lumOff val="25000"/>
+                </a:schemeClr>
+              </a:solidFill>
+              <a:latin typeface="Calibri" charset="0"/>
+              <a:ea typeface="Calibri" charset="0"/>
+              <a:cs typeface="Calibri" charset="0"/>
+            </a:endParaRPr>
+          </a:p>
+          <a:p>
+            <a:pPr algn="just"/>
+            <a:r>
+              <a:rPr lang="en-US" altLang="ko-KR" sz="2800" b="1" dirty="0" smtClean="0"/>
+              <a:t>RQ2</a:t>
+            </a:r>
+            <a:endParaRPr lang="en-US" altLang="ko-KR" sz="2400" dirty="0" smtClean="0">
+              <a:solidFill>
+                <a:schemeClr val="tx1">
+                  <a:lumMod val="75000"/>
+                  <a:lumOff val="25000"/>
+                </a:schemeClr>
+              </a:solidFill>
+              <a:latin typeface="Calibri" charset="0"/>
+              <a:ea typeface="Calibri" charset="0"/>
+              <a:cs typeface="Calibri" charset="0"/>
+            </a:endParaRPr>
+          </a:p>
+          <a:p>
+            <a:pPr marL="342900" indent="-342900" algn="just">
+              <a:buFontTx/>
+              <a:buChar char="-"/>
+            </a:pPr>
+            <a:r>
+              <a:rPr lang="en-US" altLang="ko-KR" sz="2400" dirty="0" smtClean="0">
+                <a:solidFill>
+                  <a:schemeClr val="tx1">
+                    <a:lumMod val="75000"/>
+                    <a:lumOff val="25000"/>
+                  </a:schemeClr>
+                </a:solidFill>
+                <a:latin typeface="Calibri" charset="0"/>
+                <a:ea typeface="Calibri" charset="0"/>
+                <a:cs typeface="Calibri" charset="0"/>
+              </a:rPr>
+              <a:t>Can a victim obfuscate eavesdropper by simply turning off prefetching in their browser?</a:t>
+            </a:r>
+          </a:p>
+          <a:p>
+            <a:pPr marL="342900" indent="-342900" algn="just">
+              <a:buFontTx/>
+              <a:buChar char="-"/>
+            </a:pPr>
+            <a:endParaRPr lang="en-US" altLang="ko-KR" sz="2400" dirty="0" smtClean="0">
+              <a:solidFill>
+                <a:schemeClr val="tx1">
+                  <a:lumMod val="75000"/>
+                  <a:lumOff val="25000"/>
+                </a:schemeClr>
+              </a:solidFill>
+              <a:latin typeface="Calibri" charset="0"/>
+              <a:ea typeface="Calibri" charset="0"/>
+              <a:cs typeface="Calibri" charset="0"/>
+            </a:endParaRPr>
+          </a:p>
+          <a:p>
+            <a:pPr algn="just"/>
+            <a:r>
+              <a:rPr lang="en-US" altLang="ko-KR" sz="2800" b="1" dirty="0" smtClean="0"/>
+              <a:t>RQ3</a:t>
+            </a:r>
+            <a:endParaRPr lang="en-US" altLang="ko-KR" sz="2400" dirty="0" smtClean="0">
+              <a:solidFill>
+                <a:schemeClr val="tx1">
+                  <a:lumMod val="75000"/>
+                  <a:lumOff val="25000"/>
+                </a:schemeClr>
+              </a:solidFill>
+              <a:latin typeface="Calibri" charset="0"/>
+              <a:ea typeface="Calibri" charset="0"/>
+              <a:cs typeface="Calibri" charset="0"/>
+            </a:endParaRPr>
+          </a:p>
+          <a:p>
+            <a:pPr marL="342900" indent="-342900" algn="just">
+              <a:buFontTx/>
+              <a:buChar char="-"/>
+            </a:pPr>
+            <a:r>
+              <a:rPr lang="en-US" altLang="ko-KR" sz="2400" dirty="0" smtClean="0">
+                <a:solidFill>
+                  <a:schemeClr val="tx1">
+                    <a:lumMod val="75000"/>
+                    <a:lumOff val="25000"/>
+                  </a:schemeClr>
+                </a:solidFill>
+                <a:latin typeface="Calibri" charset="0"/>
+                <a:ea typeface="Calibri" charset="0"/>
+                <a:cs typeface="Calibri" charset="0"/>
+              </a:rPr>
+              <a:t>Can prefetching be used as a browser-side defense mechanism?</a:t>
+            </a:r>
+          </a:p>
+          <a:p>
+            <a:pPr algn="just"/>
+            <a:endParaRPr lang="en-US" altLang="ko-KR" sz="2400" dirty="0">
+              <a:solidFill>
+                <a:schemeClr val="tx1">
+                  <a:lumMod val="75000"/>
+                  <a:lumOff val="25000"/>
+                </a:schemeClr>
+              </a:solidFill>
+              <a:latin typeface="Calibri" charset="0"/>
+              <a:ea typeface="Calibri" charset="0"/>
+              <a:cs typeface="Calibri" charset="0"/>
+            </a:endParaRPr>
+          </a:p>
+        </p:txBody>
+      </p:sp>
+      <p:sp>
+        <p:nvSpPr>
+          <p:cNvPr id="6" name="Title 1"/>
+          <p:cNvSpPr txBox="1">
+            <a:spLocks/>
+          </p:cNvSpPr>
+          <p:nvPr/>
+        </p:nvSpPr>
+        <p:spPr>
+          <a:xfrm>
+            <a:off x="409576" y="232031"/>
+            <a:ext cx="9479494" cy="734889"/>
+          </a:xfrm>
+          <a:prstGeom prst="rect">
+            <a:avLst/>
+          </a:prstGeom>
+        </p:spPr>
+        <p:txBody>
+          <a:bodyPr vert="horz" lIns="91440" tIns="45720" rIns="91440" bIns="45720" rtlCol="0" anchor="b">
+            <a:normAutofit/>
+          </a:bodyPr>
+          <a:lstStyle>
+            <a:lvl1pPr algn="l" defTabSz="914400" rtl="0" eaLnBrk="1" latinLnBrk="0" hangingPunct="1">
+              <a:lnSpc>
+                <a:spcPct val="85000"/>
+              </a:lnSpc>
+              <a:spcBef>
+                <a:spcPct val="0"/>
+              </a:spcBef>
+              <a:buNone/>
+              <a:defRPr sz="4800" kern="1200" spc="-50" baseline="0">
+                <a:solidFill>
+                  <a:schemeClr val="tx1">
+                    <a:lumMod val="75000"/>
+                    <a:lumOff val="25000"/>
+                  </a:schemeClr>
+                </a:solidFill>
+                <a:latin typeface="+mj-lt"/>
+                <a:ea typeface="+mj-ea"/>
+                <a:cs typeface="+mj-cs"/>
+              </a:defRPr>
+            </a:lvl1pPr>
+          </a:lstStyle>
+          <a:p>
+            <a:r>
+              <a:rPr lang="en-US" b="1" dirty="0" smtClean="0"/>
+              <a:t>Research Questions</a:t>
+            </a:r>
+            <a:endParaRPr lang="en-US" b="1" dirty="0"/>
+          </a:p>
+        </p:txBody>
+      </p:sp>
+      <p:sp>
+        <p:nvSpPr>
+          <p:cNvPr id="8" name="TextBox 7"/>
           <p:cNvSpPr txBox="1"/>
           <p:nvPr/>
         </p:nvSpPr>
         <p:spPr>
           <a:xfrm>
-            <a:off x="2854412" y="2798234"/>
-            <a:ext cx="3855308" cy="923330"/>
+            <a:off x="2614246" y="1266092"/>
+            <a:ext cx="184731" cy="369332"/>
           </a:xfrm>
           <a:prstGeom prst="rect">
             <a:avLst/>
@@ -7709,31 +9791,748 @@
           <a:noFill/>
         </p:spPr>
         <p:txBody>
-          <a:bodyPr wrap="square" rtlCol="0">
+          <a:bodyPr wrap="none" rtlCol="0">
             <a:spAutoFit/>
           </a:bodyPr>
           <a:lstStyle/>
           <a:p>
-            <a:r>
-              <a:rPr lang="en-US" sz="5400" b="1" dirty="0" smtClean="0">
-                <a:solidFill>
-                  <a:schemeClr val="bg1"/>
-                </a:solidFill>
-              </a:rPr>
-              <a:t>THANK YOU</a:t>
-            </a:r>
-            <a:endParaRPr lang="en-US" sz="5400" b="1" dirty="0">
-              <a:solidFill>
-                <a:schemeClr val="bg1"/>
-              </a:solidFill>
-            </a:endParaRPr>
+            <a:endParaRPr lang="en-US" dirty="0"/>
           </a:p>
         </p:txBody>
       </p:sp>
     </p:spTree>
     <p:extLst>
       <p:ext uri="{BB962C8B-B14F-4D97-AF65-F5344CB8AC3E}">
-        <p14:creationId xmlns:p14="http://schemas.microsoft.com/office/powerpoint/2010/main" val="1695459882"/>
+        <p14:creationId xmlns:p14="http://schemas.microsoft.com/office/powerpoint/2010/main" val="1631667967"/>
+      </p:ext>
+    </p:extLst>
+  </p:cSld>
+  <p:clrMapOvr>
+    <a:masterClrMapping/>
+  </p:clrMapOvr>
+  <p:timing>
+    <p:tnLst>
+      <p:par>
+        <p:cTn id="1" dur="indefinite" restart="never" nodeType="tmRoot"/>
+      </p:par>
+    </p:tnLst>
+  </p:timing>
+</p:sld>
+</file>
+
+<file path=ppt/slides/slide16.xml><?xml version="1.0" encoding="utf-8"?>
+<p:sld xmlns:a="http://schemas.openxmlformats.org/drawingml/2006/main" xmlns:r="http://schemas.openxmlformats.org/officeDocument/2006/relationships" xmlns:p="http://schemas.openxmlformats.org/presentationml/2006/main">
+  <p:cSld>
+    <p:spTree>
+      <p:nvGrpSpPr>
+        <p:cNvPr id="1" name=""/>
+        <p:cNvGrpSpPr/>
+        <p:nvPr/>
+      </p:nvGrpSpPr>
+      <p:grpSpPr>
+        <a:xfrm>
+          <a:off x="0" y="0"/>
+          <a:ext cx="0" cy="0"/>
+          <a:chOff x="0" y="0"/>
+          <a:chExt cx="0" cy="0"/>
+        </a:xfrm>
+      </p:grpSpPr>
+      <p:sp>
+        <p:nvSpPr>
+          <p:cNvPr id="3" name="Slide Number Placeholder 2"/>
+          <p:cNvSpPr>
+            <a:spLocks noGrp="1"/>
+          </p:cNvSpPr>
+          <p:nvPr>
+            <p:ph type="sldNum" sz="quarter" idx="4294967295"/>
+          </p:nvPr>
+        </p:nvSpPr>
+        <p:spPr>
+          <a:xfrm>
+            <a:off x="-237705" y="6459786"/>
+            <a:ext cx="984019" cy="365125"/>
+          </a:xfrm>
+        </p:spPr>
+        <p:txBody>
+          <a:bodyPr/>
+          <a:lstStyle/>
+          <a:p>
+            <a:fld id="{629637A9-119A-49DA-BD12-AAC58B377D80}" type="slidenum">
+              <a:rPr lang="en-US" smtClean="0"/>
+              <a:t>16</a:t>
+            </a:fld>
+            <a:endParaRPr lang="en-US" dirty="0"/>
+          </a:p>
+        </p:txBody>
+      </p:sp>
+      <p:sp>
+        <p:nvSpPr>
+          <p:cNvPr id="4" name="Rectangle 3"/>
+          <p:cNvSpPr/>
+          <p:nvPr/>
+        </p:nvSpPr>
+        <p:spPr>
+          <a:xfrm>
+            <a:off x="349416" y="1026916"/>
+            <a:ext cx="8360830" cy="954107"/>
+          </a:xfrm>
+          <a:prstGeom prst="rect">
+            <a:avLst/>
+          </a:prstGeom>
+        </p:spPr>
+        <p:txBody>
+          <a:bodyPr wrap="square">
+            <a:spAutoFit/>
+          </a:bodyPr>
+          <a:lstStyle/>
+          <a:p>
+            <a:pPr algn="just"/>
+            <a:r>
+              <a:rPr lang="en-US" altLang="ko-KR" sz="2800" b="1" dirty="0" smtClean="0"/>
+              <a:t>RQ1</a:t>
+            </a:r>
+            <a:r>
+              <a:rPr lang="en-US" altLang="ko-KR" sz="2800" dirty="0" smtClean="0">
+                <a:solidFill>
+                  <a:schemeClr val="tx1">
+                    <a:lumMod val="75000"/>
+                    <a:lumOff val="25000"/>
+                  </a:schemeClr>
+                </a:solidFill>
+                <a:latin typeface="Calibri" charset="0"/>
+                <a:ea typeface="Calibri" charset="0"/>
+                <a:cs typeface="Calibri" charset="0"/>
+              </a:rPr>
+              <a:t>: Does prefetching itself provide an extra degree of defense?</a:t>
+            </a:r>
+          </a:p>
+        </p:txBody>
+      </p:sp>
+      <p:sp>
+        <p:nvSpPr>
+          <p:cNvPr id="6" name="Title 1"/>
+          <p:cNvSpPr txBox="1">
+            <a:spLocks/>
+          </p:cNvSpPr>
+          <p:nvPr/>
+        </p:nvSpPr>
+        <p:spPr>
+          <a:xfrm>
+            <a:off x="409576" y="232031"/>
+            <a:ext cx="9479494" cy="734889"/>
+          </a:xfrm>
+          <a:prstGeom prst="rect">
+            <a:avLst/>
+          </a:prstGeom>
+        </p:spPr>
+        <p:txBody>
+          <a:bodyPr vert="horz" lIns="91440" tIns="45720" rIns="91440" bIns="45720" rtlCol="0" anchor="b">
+            <a:normAutofit/>
+          </a:bodyPr>
+          <a:lstStyle>
+            <a:lvl1pPr algn="l" defTabSz="914400" rtl="0" eaLnBrk="1" latinLnBrk="0" hangingPunct="1">
+              <a:lnSpc>
+                <a:spcPct val="85000"/>
+              </a:lnSpc>
+              <a:spcBef>
+                <a:spcPct val="0"/>
+              </a:spcBef>
+              <a:buNone/>
+              <a:defRPr sz="4800" kern="1200" spc="-50" baseline="0">
+                <a:solidFill>
+                  <a:schemeClr val="tx1">
+                    <a:lumMod val="75000"/>
+                    <a:lumOff val="25000"/>
+                  </a:schemeClr>
+                </a:solidFill>
+                <a:latin typeface="+mj-lt"/>
+                <a:ea typeface="+mj-ea"/>
+                <a:cs typeface="+mj-cs"/>
+              </a:defRPr>
+            </a:lvl1pPr>
+          </a:lstStyle>
+          <a:p>
+            <a:r>
+              <a:rPr lang="en-US" b="1" dirty="0" smtClean="0"/>
+              <a:t>Experiment</a:t>
+            </a:r>
+            <a:endParaRPr lang="en-US" b="1" dirty="0"/>
+          </a:p>
+        </p:txBody>
+      </p:sp>
+      <p:sp>
+        <p:nvSpPr>
+          <p:cNvPr id="8" name="TextBox 7"/>
+          <p:cNvSpPr txBox="1"/>
+          <p:nvPr/>
+        </p:nvSpPr>
+        <p:spPr>
+          <a:xfrm>
+            <a:off x="2614246" y="1266092"/>
+            <a:ext cx="184731" cy="369332"/>
+          </a:xfrm>
+          <a:prstGeom prst="rect">
+            <a:avLst/>
+          </a:prstGeom>
+          <a:noFill/>
+        </p:spPr>
+        <p:txBody>
+          <a:bodyPr wrap="none" rtlCol="0">
+            <a:spAutoFit/>
+          </a:bodyPr>
+          <a:lstStyle/>
+          <a:p>
+            <a:endParaRPr lang="en-US" dirty="0"/>
+          </a:p>
+        </p:txBody>
+      </p:sp>
+    </p:spTree>
+    <p:extLst>
+      <p:ext uri="{BB962C8B-B14F-4D97-AF65-F5344CB8AC3E}">
+        <p14:creationId xmlns:p14="http://schemas.microsoft.com/office/powerpoint/2010/main" val="152326244"/>
+      </p:ext>
+    </p:extLst>
+  </p:cSld>
+  <p:clrMapOvr>
+    <a:masterClrMapping/>
+  </p:clrMapOvr>
+  <p:timing>
+    <p:tnLst>
+      <p:par>
+        <p:cTn id="1" dur="indefinite" restart="never" nodeType="tmRoot"/>
+      </p:par>
+    </p:tnLst>
+  </p:timing>
+</p:sld>
+</file>
+
+<file path=ppt/slides/slide17.xml><?xml version="1.0" encoding="utf-8"?>
+<p:sld xmlns:a="http://schemas.openxmlformats.org/drawingml/2006/main" xmlns:r="http://schemas.openxmlformats.org/officeDocument/2006/relationships" xmlns:p="http://schemas.openxmlformats.org/presentationml/2006/main">
+  <p:cSld>
+    <p:spTree>
+      <p:nvGrpSpPr>
+        <p:cNvPr id="1" name=""/>
+        <p:cNvGrpSpPr/>
+        <p:nvPr/>
+      </p:nvGrpSpPr>
+      <p:grpSpPr>
+        <a:xfrm>
+          <a:off x="0" y="0"/>
+          <a:ext cx="0" cy="0"/>
+          <a:chOff x="0" y="0"/>
+          <a:chExt cx="0" cy="0"/>
+        </a:xfrm>
+      </p:grpSpPr>
+      <p:sp>
+        <p:nvSpPr>
+          <p:cNvPr id="3" name="Slide Number Placeholder 2"/>
+          <p:cNvSpPr>
+            <a:spLocks noGrp="1"/>
+          </p:cNvSpPr>
+          <p:nvPr>
+            <p:ph type="sldNum" sz="quarter" idx="4294967295"/>
+          </p:nvPr>
+        </p:nvSpPr>
+        <p:spPr>
+          <a:xfrm>
+            <a:off x="-237705" y="6459786"/>
+            <a:ext cx="984019" cy="365125"/>
+          </a:xfrm>
+        </p:spPr>
+        <p:txBody>
+          <a:bodyPr/>
+          <a:lstStyle/>
+          <a:p>
+            <a:fld id="{629637A9-119A-49DA-BD12-AAC58B377D80}" type="slidenum">
+              <a:rPr lang="en-US" smtClean="0"/>
+              <a:t>17</a:t>
+            </a:fld>
+            <a:endParaRPr lang="en-US" dirty="0"/>
+          </a:p>
+        </p:txBody>
+      </p:sp>
+      <p:sp>
+        <p:nvSpPr>
+          <p:cNvPr id="4" name="Rectangle 3"/>
+          <p:cNvSpPr/>
+          <p:nvPr/>
+        </p:nvSpPr>
+        <p:spPr>
+          <a:xfrm>
+            <a:off x="349416" y="1026916"/>
+            <a:ext cx="8360830" cy="892552"/>
+          </a:xfrm>
+          <a:prstGeom prst="rect">
+            <a:avLst/>
+          </a:prstGeom>
+        </p:spPr>
+        <p:txBody>
+          <a:bodyPr wrap="square">
+            <a:spAutoFit/>
+          </a:bodyPr>
+          <a:lstStyle/>
+          <a:p>
+            <a:pPr algn="just"/>
+            <a:r>
+              <a:rPr lang="en-US" altLang="ko-KR" sz="2800" b="1" dirty="0" smtClean="0"/>
+              <a:t>RQ2: </a:t>
+            </a:r>
+            <a:r>
+              <a:rPr lang="en-US" altLang="ko-KR" sz="2400" dirty="0" smtClean="0">
+                <a:solidFill>
+                  <a:schemeClr val="tx1">
+                    <a:lumMod val="75000"/>
+                    <a:lumOff val="25000"/>
+                  </a:schemeClr>
+                </a:solidFill>
+                <a:latin typeface="Calibri" charset="0"/>
+                <a:ea typeface="Calibri" charset="0"/>
+                <a:cs typeface="Calibri" charset="0"/>
+              </a:rPr>
+              <a:t>Can a victim obfuscate eavesdropper by simply turning off prefetching in their browser?</a:t>
+            </a:r>
+          </a:p>
+        </p:txBody>
+      </p:sp>
+      <p:sp>
+        <p:nvSpPr>
+          <p:cNvPr id="6" name="Title 1"/>
+          <p:cNvSpPr txBox="1">
+            <a:spLocks/>
+          </p:cNvSpPr>
+          <p:nvPr/>
+        </p:nvSpPr>
+        <p:spPr>
+          <a:xfrm>
+            <a:off x="409576" y="232031"/>
+            <a:ext cx="9479494" cy="734889"/>
+          </a:xfrm>
+          <a:prstGeom prst="rect">
+            <a:avLst/>
+          </a:prstGeom>
+        </p:spPr>
+        <p:txBody>
+          <a:bodyPr vert="horz" lIns="91440" tIns="45720" rIns="91440" bIns="45720" rtlCol="0" anchor="b">
+            <a:normAutofit/>
+          </a:bodyPr>
+          <a:lstStyle>
+            <a:lvl1pPr algn="l" defTabSz="914400" rtl="0" eaLnBrk="1" latinLnBrk="0" hangingPunct="1">
+              <a:lnSpc>
+                <a:spcPct val="85000"/>
+              </a:lnSpc>
+              <a:spcBef>
+                <a:spcPct val="0"/>
+              </a:spcBef>
+              <a:buNone/>
+              <a:defRPr sz="4800" kern="1200" spc="-50" baseline="0">
+                <a:solidFill>
+                  <a:schemeClr val="tx1">
+                    <a:lumMod val="75000"/>
+                    <a:lumOff val="25000"/>
+                  </a:schemeClr>
+                </a:solidFill>
+                <a:latin typeface="+mj-lt"/>
+                <a:ea typeface="+mj-ea"/>
+                <a:cs typeface="+mj-cs"/>
+              </a:defRPr>
+            </a:lvl1pPr>
+          </a:lstStyle>
+          <a:p>
+            <a:r>
+              <a:rPr lang="en-US" b="1" dirty="0" smtClean="0"/>
+              <a:t>Experiment</a:t>
+            </a:r>
+            <a:endParaRPr lang="en-US" b="1" dirty="0"/>
+          </a:p>
+        </p:txBody>
+      </p:sp>
+      <p:sp>
+        <p:nvSpPr>
+          <p:cNvPr id="8" name="TextBox 7"/>
+          <p:cNvSpPr txBox="1"/>
+          <p:nvPr/>
+        </p:nvSpPr>
+        <p:spPr>
+          <a:xfrm>
+            <a:off x="2614246" y="1266092"/>
+            <a:ext cx="184731" cy="369332"/>
+          </a:xfrm>
+          <a:prstGeom prst="rect">
+            <a:avLst/>
+          </a:prstGeom>
+          <a:noFill/>
+        </p:spPr>
+        <p:txBody>
+          <a:bodyPr wrap="none" rtlCol="0">
+            <a:spAutoFit/>
+          </a:bodyPr>
+          <a:lstStyle/>
+          <a:p>
+            <a:endParaRPr lang="en-US" dirty="0"/>
+          </a:p>
+        </p:txBody>
+      </p:sp>
+    </p:spTree>
+    <p:extLst>
+      <p:ext uri="{BB962C8B-B14F-4D97-AF65-F5344CB8AC3E}">
+        <p14:creationId xmlns:p14="http://schemas.microsoft.com/office/powerpoint/2010/main" val="530846660"/>
+      </p:ext>
+    </p:extLst>
+  </p:cSld>
+  <p:clrMapOvr>
+    <a:masterClrMapping/>
+  </p:clrMapOvr>
+  <p:timing>
+    <p:tnLst>
+      <p:par>
+        <p:cTn id="1" dur="indefinite" restart="never" nodeType="tmRoot"/>
+      </p:par>
+    </p:tnLst>
+  </p:timing>
+</p:sld>
+</file>
+
+<file path=ppt/slides/slide18.xml><?xml version="1.0" encoding="utf-8"?>
+<p:sld xmlns:a="http://schemas.openxmlformats.org/drawingml/2006/main" xmlns:r="http://schemas.openxmlformats.org/officeDocument/2006/relationships" xmlns:p="http://schemas.openxmlformats.org/presentationml/2006/main">
+  <p:cSld>
+    <p:spTree>
+      <p:nvGrpSpPr>
+        <p:cNvPr id="1" name=""/>
+        <p:cNvGrpSpPr/>
+        <p:nvPr/>
+      </p:nvGrpSpPr>
+      <p:grpSpPr>
+        <a:xfrm>
+          <a:off x="0" y="0"/>
+          <a:ext cx="0" cy="0"/>
+          <a:chOff x="0" y="0"/>
+          <a:chExt cx="0" cy="0"/>
+        </a:xfrm>
+      </p:grpSpPr>
+      <p:sp>
+        <p:nvSpPr>
+          <p:cNvPr id="3" name="Slide Number Placeholder 2"/>
+          <p:cNvSpPr>
+            <a:spLocks noGrp="1"/>
+          </p:cNvSpPr>
+          <p:nvPr>
+            <p:ph type="sldNum" sz="quarter" idx="4294967295"/>
+          </p:nvPr>
+        </p:nvSpPr>
+        <p:spPr>
+          <a:xfrm>
+            <a:off x="-237705" y="6459786"/>
+            <a:ext cx="984019" cy="365125"/>
+          </a:xfrm>
+        </p:spPr>
+        <p:txBody>
+          <a:bodyPr/>
+          <a:lstStyle/>
+          <a:p>
+            <a:fld id="{629637A9-119A-49DA-BD12-AAC58B377D80}" type="slidenum">
+              <a:rPr lang="en-US" smtClean="0"/>
+              <a:t>18</a:t>
+            </a:fld>
+            <a:endParaRPr lang="en-US" dirty="0"/>
+          </a:p>
+        </p:txBody>
+      </p:sp>
+      <p:sp>
+        <p:nvSpPr>
+          <p:cNvPr id="4" name="Rectangle 3"/>
+          <p:cNvSpPr/>
+          <p:nvPr/>
+        </p:nvSpPr>
+        <p:spPr>
+          <a:xfrm>
+            <a:off x="349416" y="1026916"/>
+            <a:ext cx="8360830" cy="1261884"/>
+          </a:xfrm>
+          <a:prstGeom prst="rect">
+            <a:avLst/>
+          </a:prstGeom>
+        </p:spPr>
+        <p:txBody>
+          <a:bodyPr wrap="square">
+            <a:spAutoFit/>
+          </a:bodyPr>
+          <a:lstStyle/>
+          <a:p>
+            <a:pPr algn="just"/>
+            <a:r>
+              <a:rPr lang="en-US" altLang="ko-KR" sz="2800" b="1" dirty="0" smtClean="0"/>
+              <a:t>RQ3:</a:t>
+            </a:r>
+            <a:r>
+              <a:rPr lang="en-US" altLang="ko-KR" sz="2400" dirty="0" smtClean="0">
+                <a:solidFill>
+                  <a:schemeClr val="tx1">
+                    <a:lumMod val="75000"/>
+                    <a:lumOff val="25000"/>
+                  </a:schemeClr>
+                </a:solidFill>
+                <a:latin typeface="Calibri" charset="0"/>
+                <a:ea typeface="Calibri" charset="0"/>
+                <a:cs typeface="Calibri" charset="0"/>
+              </a:rPr>
+              <a:t> Can prefetching be used as a browser-side defense mechanism?</a:t>
+            </a:r>
+          </a:p>
+          <a:p>
+            <a:pPr algn="just"/>
+            <a:endParaRPr lang="en-US" altLang="ko-KR" sz="2400" dirty="0">
+              <a:solidFill>
+                <a:schemeClr val="tx1">
+                  <a:lumMod val="75000"/>
+                  <a:lumOff val="25000"/>
+                </a:schemeClr>
+              </a:solidFill>
+              <a:latin typeface="Calibri" charset="0"/>
+              <a:ea typeface="Calibri" charset="0"/>
+              <a:cs typeface="Calibri" charset="0"/>
+            </a:endParaRPr>
+          </a:p>
+        </p:txBody>
+      </p:sp>
+      <p:sp>
+        <p:nvSpPr>
+          <p:cNvPr id="6" name="Title 1"/>
+          <p:cNvSpPr txBox="1">
+            <a:spLocks/>
+          </p:cNvSpPr>
+          <p:nvPr/>
+        </p:nvSpPr>
+        <p:spPr>
+          <a:xfrm>
+            <a:off x="409576" y="232031"/>
+            <a:ext cx="9479494" cy="734889"/>
+          </a:xfrm>
+          <a:prstGeom prst="rect">
+            <a:avLst/>
+          </a:prstGeom>
+        </p:spPr>
+        <p:txBody>
+          <a:bodyPr vert="horz" lIns="91440" tIns="45720" rIns="91440" bIns="45720" rtlCol="0" anchor="b">
+            <a:normAutofit/>
+          </a:bodyPr>
+          <a:lstStyle>
+            <a:lvl1pPr algn="l" defTabSz="914400" rtl="0" eaLnBrk="1" latinLnBrk="0" hangingPunct="1">
+              <a:lnSpc>
+                <a:spcPct val="85000"/>
+              </a:lnSpc>
+              <a:spcBef>
+                <a:spcPct val="0"/>
+              </a:spcBef>
+              <a:buNone/>
+              <a:defRPr sz="4800" kern="1200" spc="-50" baseline="0">
+                <a:solidFill>
+                  <a:schemeClr val="tx1">
+                    <a:lumMod val="75000"/>
+                    <a:lumOff val="25000"/>
+                  </a:schemeClr>
+                </a:solidFill>
+                <a:latin typeface="+mj-lt"/>
+                <a:ea typeface="+mj-ea"/>
+                <a:cs typeface="+mj-cs"/>
+              </a:defRPr>
+            </a:lvl1pPr>
+          </a:lstStyle>
+          <a:p>
+            <a:r>
+              <a:rPr lang="en-US" b="1" dirty="0" smtClean="0"/>
+              <a:t>Experiment</a:t>
+            </a:r>
+            <a:endParaRPr lang="en-US" b="1" dirty="0"/>
+          </a:p>
+        </p:txBody>
+      </p:sp>
+      <p:sp>
+        <p:nvSpPr>
+          <p:cNvPr id="8" name="TextBox 7"/>
+          <p:cNvSpPr txBox="1"/>
+          <p:nvPr/>
+        </p:nvSpPr>
+        <p:spPr>
+          <a:xfrm>
+            <a:off x="2614246" y="1266092"/>
+            <a:ext cx="184731" cy="369332"/>
+          </a:xfrm>
+          <a:prstGeom prst="rect">
+            <a:avLst/>
+          </a:prstGeom>
+          <a:noFill/>
+        </p:spPr>
+        <p:txBody>
+          <a:bodyPr wrap="none" rtlCol="0">
+            <a:spAutoFit/>
+          </a:bodyPr>
+          <a:lstStyle/>
+          <a:p>
+            <a:endParaRPr lang="en-US" dirty="0"/>
+          </a:p>
+        </p:txBody>
+      </p:sp>
+    </p:spTree>
+    <p:extLst>
+      <p:ext uri="{BB962C8B-B14F-4D97-AF65-F5344CB8AC3E}">
+        <p14:creationId xmlns:p14="http://schemas.microsoft.com/office/powerpoint/2010/main" val="1374652450"/>
+      </p:ext>
+    </p:extLst>
+  </p:cSld>
+  <p:clrMapOvr>
+    <a:masterClrMapping/>
+  </p:clrMapOvr>
+  <p:timing>
+    <p:tnLst>
+      <p:par>
+        <p:cTn id="1" dur="indefinite" restart="never" nodeType="tmRoot"/>
+      </p:par>
+    </p:tnLst>
+  </p:timing>
+</p:sld>
+</file>
+
+<file path=ppt/slides/slide19.xml><?xml version="1.0" encoding="utf-8"?>
+<p:sld xmlns:a="http://schemas.openxmlformats.org/drawingml/2006/main" xmlns:r="http://schemas.openxmlformats.org/officeDocument/2006/relationships" xmlns:p="http://schemas.openxmlformats.org/presentationml/2006/main">
+  <p:cSld>
+    <p:spTree>
+      <p:nvGrpSpPr>
+        <p:cNvPr id="1" name=""/>
+        <p:cNvGrpSpPr/>
+        <p:nvPr/>
+      </p:nvGrpSpPr>
+      <p:grpSpPr>
+        <a:xfrm>
+          <a:off x="0" y="0"/>
+          <a:ext cx="0" cy="0"/>
+          <a:chOff x="0" y="0"/>
+          <a:chExt cx="0" cy="0"/>
+        </a:xfrm>
+      </p:grpSpPr>
+      <p:sp>
+        <p:nvSpPr>
+          <p:cNvPr id="9" name="Rectangle 8"/>
+          <p:cNvSpPr/>
+          <p:nvPr/>
+        </p:nvSpPr>
+        <p:spPr>
+          <a:xfrm>
+            <a:off x="319925" y="966920"/>
+            <a:ext cx="8331015" cy="769441"/>
+          </a:xfrm>
+          <a:prstGeom prst="rect">
+            <a:avLst/>
+          </a:prstGeom>
+        </p:spPr>
+        <p:txBody>
+          <a:bodyPr wrap="square">
+            <a:spAutoFit/>
+          </a:bodyPr>
+          <a:lstStyle/>
+          <a:p>
+            <a:pPr lvl="0" algn="just" latinLnBrk="1"/>
+            <a:r>
+              <a:rPr lang="en-US" sz="2400" b="1" dirty="0" smtClean="0"/>
+              <a:t>For</a:t>
+            </a:r>
+          </a:p>
+          <a:p>
+            <a:pPr marL="342900" lvl="0" indent="-342900" algn="just" latinLnBrk="1">
+              <a:buFont typeface="Arial" panose="020B0604020202020204" pitchFamily="34" charset="0"/>
+              <a:buChar char="•"/>
+            </a:pPr>
+            <a:r>
+              <a:rPr lang="en-US" sz="2000" dirty="0" smtClean="0"/>
+              <a:t>document</a:t>
+            </a:r>
+            <a:endParaRPr lang="en-US" sz="2000" dirty="0"/>
+          </a:p>
+        </p:txBody>
+      </p:sp>
+      <p:sp>
+        <p:nvSpPr>
+          <p:cNvPr id="3" name="Slide Number Placeholder 2"/>
+          <p:cNvSpPr>
+            <a:spLocks noGrp="1"/>
+          </p:cNvSpPr>
+          <p:nvPr>
+            <p:ph type="sldNum" sz="quarter" idx="4294967295"/>
+          </p:nvPr>
+        </p:nvSpPr>
+        <p:spPr>
+          <a:xfrm>
+            <a:off x="-237705" y="6459786"/>
+            <a:ext cx="984019" cy="365125"/>
+          </a:xfrm>
+        </p:spPr>
+        <p:txBody>
+          <a:bodyPr/>
+          <a:lstStyle/>
+          <a:p>
+            <a:fld id="{629637A9-119A-49DA-BD12-AAC58B377D80}" type="slidenum">
+              <a:rPr lang="en-US" smtClean="0"/>
+              <a:t>19</a:t>
+            </a:fld>
+            <a:endParaRPr lang="en-US" dirty="0"/>
+          </a:p>
+        </p:txBody>
+      </p:sp>
+      <p:sp>
+        <p:nvSpPr>
+          <p:cNvPr id="8" name="Title 1"/>
+          <p:cNvSpPr txBox="1">
+            <a:spLocks/>
+          </p:cNvSpPr>
+          <p:nvPr/>
+        </p:nvSpPr>
+        <p:spPr>
+          <a:xfrm>
+            <a:off x="409576" y="232031"/>
+            <a:ext cx="8626848" cy="734889"/>
+          </a:xfrm>
+          <a:prstGeom prst="rect">
+            <a:avLst/>
+          </a:prstGeom>
+        </p:spPr>
+        <p:txBody>
+          <a:bodyPr vert="horz" lIns="91440" tIns="45720" rIns="91440" bIns="45720" rtlCol="0" anchor="b">
+            <a:normAutofit/>
+          </a:bodyPr>
+          <a:lstStyle>
+            <a:lvl1pPr algn="l" defTabSz="914400" rtl="0" eaLnBrk="1" latinLnBrk="0" hangingPunct="1">
+              <a:lnSpc>
+                <a:spcPct val="85000"/>
+              </a:lnSpc>
+              <a:spcBef>
+                <a:spcPct val="0"/>
+              </a:spcBef>
+              <a:buNone/>
+              <a:defRPr sz="4800" kern="1200" spc="-50" baseline="0">
+                <a:solidFill>
+                  <a:schemeClr val="tx1">
+                    <a:lumMod val="75000"/>
+                    <a:lumOff val="25000"/>
+                  </a:schemeClr>
+                </a:solidFill>
+                <a:latin typeface="+mj-lt"/>
+                <a:ea typeface="+mj-ea"/>
+                <a:cs typeface="+mj-cs"/>
+              </a:defRPr>
+            </a:lvl1pPr>
+          </a:lstStyle>
+          <a:p>
+            <a:r>
+              <a:rPr lang="en-US" b="1" dirty="0" smtClean="0"/>
+              <a:t>Ongoing Works</a:t>
+            </a:r>
+            <a:endParaRPr lang="en-US" b="1" dirty="0"/>
+          </a:p>
+        </p:txBody>
+      </p:sp>
+    </p:spTree>
+    <p:extLst>
+      <p:ext uri="{BB962C8B-B14F-4D97-AF65-F5344CB8AC3E}">
+        <p14:creationId xmlns:p14="http://schemas.microsoft.com/office/powerpoint/2010/main" val="1482431112"/>
       </p:ext>
     </p:extLst>
   </p:cSld>
@@ -7939,6 +10738,167 @@
     <p:extLst>
       <p:ext uri="{BB962C8B-B14F-4D97-AF65-F5344CB8AC3E}">
         <p14:creationId xmlns:p14="http://schemas.microsoft.com/office/powerpoint/2010/main" val="756511675"/>
+      </p:ext>
+    </p:extLst>
+  </p:cSld>
+  <p:clrMapOvr>
+    <a:masterClrMapping/>
+  </p:clrMapOvr>
+  <p:timing>
+    <p:tnLst>
+      <p:par>
+        <p:cTn id="1" dur="indefinite" restart="never" nodeType="tmRoot"/>
+      </p:par>
+    </p:tnLst>
+  </p:timing>
+</p:sld>
+</file>
+
+<file path=ppt/slides/slide20.xml><?xml version="1.0" encoding="utf-8"?>
+<p:sld xmlns:a="http://schemas.openxmlformats.org/drawingml/2006/main" xmlns:r="http://schemas.openxmlformats.org/officeDocument/2006/relationships" xmlns:p="http://schemas.openxmlformats.org/presentationml/2006/main">
+  <p:cSld>
+    <p:spTree>
+      <p:nvGrpSpPr>
+        <p:cNvPr id="1" name=""/>
+        <p:cNvGrpSpPr/>
+        <p:nvPr/>
+      </p:nvGrpSpPr>
+      <p:grpSpPr>
+        <a:xfrm>
+          <a:off x="0" y="0"/>
+          <a:ext cx="0" cy="0"/>
+          <a:chOff x="0" y="0"/>
+          <a:chExt cx="0" cy="0"/>
+        </a:xfrm>
+      </p:grpSpPr>
+      <p:sp>
+        <p:nvSpPr>
+          <p:cNvPr id="2" name="Title 1"/>
+          <p:cNvSpPr>
+            <a:spLocks noGrp="1"/>
+          </p:cNvSpPr>
+          <p:nvPr>
+            <p:ph type="title"/>
+          </p:nvPr>
+        </p:nvSpPr>
+        <p:spPr/>
+        <p:txBody>
+          <a:bodyPr/>
+          <a:lstStyle/>
+          <a:p>
+            <a:endParaRPr lang="en-US"/>
+          </a:p>
+        </p:txBody>
+      </p:sp>
+      <p:sp>
+        <p:nvSpPr>
+          <p:cNvPr id="3" name="Content Placeholder 2"/>
+          <p:cNvSpPr>
+            <a:spLocks noGrp="1"/>
+          </p:cNvSpPr>
+          <p:nvPr>
+            <p:ph idx="1"/>
+          </p:nvPr>
+        </p:nvSpPr>
+        <p:spPr/>
+        <p:txBody>
+          <a:bodyPr/>
+          <a:lstStyle/>
+          <a:p>
+            <a:endParaRPr lang="en-US"/>
+          </a:p>
+        </p:txBody>
+      </p:sp>
+      <p:sp>
+        <p:nvSpPr>
+          <p:cNvPr id="4" name="Rectangle 3"/>
+          <p:cNvSpPr/>
+          <p:nvPr/>
+        </p:nvSpPr>
+        <p:spPr>
+          <a:xfrm>
+            <a:off x="0" y="0"/>
+            <a:ext cx="9144000" cy="6858000"/>
+          </a:xfrm>
+          <a:prstGeom prst="rect">
+            <a:avLst/>
+          </a:prstGeom>
+          <a:solidFill>
+            <a:schemeClr val="tx1"/>
+          </a:solidFill>
+          <a:ln>
+            <a:solidFill>
+              <a:schemeClr val="tx1"/>
+            </a:solidFill>
+          </a:ln>
+        </p:spPr>
+        <p:style>
+          <a:lnRef idx="2">
+            <a:schemeClr val="accent1">
+              <a:shade val="50000"/>
+            </a:schemeClr>
+          </a:lnRef>
+          <a:fillRef idx="1">
+            <a:schemeClr val="accent1"/>
+          </a:fillRef>
+          <a:effectRef idx="0">
+            <a:schemeClr val="accent1"/>
+          </a:effectRef>
+          <a:fontRef idx="minor">
+            <a:schemeClr val="lt1"/>
+          </a:fontRef>
+        </p:style>
+        <p:txBody>
+          <a:bodyPr rtlCol="0" anchor="ctr"/>
+          <a:lstStyle/>
+          <a:p>
+            <a:pPr algn="ctr"/>
+            <a:endParaRPr lang="en-US"/>
+          </a:p>
+        </p:txBody>
+      </p:sp>
+      <p:sp>
+        <p:nvSpPr>
+          <p:cNvPr id="5" name="TextBox 4"/>
+          <p:cNvSpPr txBox="1"/>
+          <p:nvPr/>
+        </p:nvSpPr>
+        <p:spPr>
+          <a:xfrm>
+            <a:off x="2854412" y="2798234"/>
+            <a:ext cx="3855308" cy="923330"/>
+          </a:xfrm>
+          <a:prstGeom prst="rect">
+            <a:avLst/>
+          </a:prstGeom>
+          <a:noFill/>
+        </p:spPr>
+        <p:txBody>
+          <a:bodyPr wrap="square" rtlCol="0">
+            <a:spAutoFit/>
+          </a:bodyPr>
+          <a:lstStyle/>
+          <a:p>
+            <a:r>
+              <a:rPr lang="en-US" sz="5400" b="1" dirty="0" smtClean="0">
+                <a:solidFill>
+                  <a:schemeClr val="bg1"/>
+                </a:solidFill>
+              </a:rPr>
+              <a:t>THANK YOU</a:t>
+            </a:r>
+            <a:endParaRPr lang="en-US" sz="5400" b="1" dirty="0">
+              <a:solidFill>
+                <a:schemeClr val="bg1"/>
+              </a:solidFill>
+            </a:endParaRPr>
+          </a:p>
+        </p:txBody>
+      </p:sp>
+    </p:spTree>
+    <p:extLst>
+      <p:ext uri="{BB962C8B-B14F-4D97-AF65-F5344CB8AC3E}">
+        <p14:creationId xmlns:p14="http://schemas.microsoft.com/office/powerpoint/2010/main" val="1695459882"/>
       </p:ext>
     </p:extLst>
   </p:cSld>

</xml_diff>